<commit_message>
+ added last slide
</commit_message>
<xml_diff>
--- a/presentation/PresentationFinal.pptx
+++ b/presentation/PresentationFinal.pptx
@@ -19,6 +19,7 @@
     <p:sldId id="267" r:id="rId13"/>
     <p:sldId id="268" r:id="rId14"/>
     <p:sldId id="269" r:id="rId15"/>
+    <p:sldId id="270" r:id="rId16"/>
   </p:sldIdLst>
   <p:sldSz cx="12192000" cy="6858000"/>
   <p:notesSz cx="6858000" cy="9144000"/>
@@ -117,6 +118,11 @@
       </a:defRPr>
     </a:lvl9pPr>
   </p:defaultTextStyle>
+  <p:extLst>
+    <p:ext uri="{EFAFB233-063F-42B5-8137-9DF3F51BA10A}">
+      <p15:sldGuideLst xmlns:p15="http://schemas.microsoft.com/office/powerpoint/2012/main"/>
+    </p:ext>
+  </p:extLst>
 </p:presentation>
 </file>
 
@@ -5864,10 +5870,10 @@
           <a:p>
             <a:pPr algn="ctr"/>
             <a:r>
-              <a:rPr lang="en-US" dirty="0" smtClean="0"/>
+              <a:rPr lang="en-US" b="1" dirty="0" smtClean="0"/>
               <a:t>STS</a:t>
             </a:r>
-            <a:endParaRPr lang="bg-BG" dirty="0"/>
+            <a:endParaRPr lang="bg-BG" b="1" dirty="0"/>
           </a:p>
         </p:txBody>
       </p:sp>
@@ -5881,7 +5887,12 @@
             <p:ph type="subTitle" idx="1"/>
           </p:nvPr>
         </p:nvSpPr>
-        <p:spPr/>
+        <p:spPr>
+          <a:xfrm>
+            <a:off x="1507067" y="4490780"/>
+            <a:ext cx="7766936" cy="1096899"/>
+          </a:xfrm>
+        </p:spPr>
         <p:txBody>
           <a:bodyPr>
             <a:normAutofit lnSpcReduction="10000"/>
@@ -5889,22 +5900,38 @@
           <a:lstStyle/>
           <a:p>
             <a:r>
-              <a:rPr lang="bg-BG" dirty="0" smtClean="0"/>
+              <a:rPr lang="bg-BG" dirty="0" smtClean="0">
+                <a:solidFill>
+                  <a:schemeClr val="tx1"/>
+                </a:solidFill>
+              </a:rPr>
               <a:t>Симона Янакиева</a:t>
             </a:r>
           </a:p>
           <a:p>
             <a:r>
-              <a:rPr lang="bg-BG" dirty="0" smtClean="0"/>
+              <a:rPr lang="bg-BG" dirty="0" smtClean="0">
+                <a:solidFill>
+                  <a:schemeClr val="tx1"/>
+                </a:solidFill>
+              </a:rPr>
               <a:t>Цветина Георгиева</a:t>
             </a:r>
           </a:p>
           <a:p>
             <a:r>
-              <a:rPr lang="bg-BG" dirty="0" smtClean="0"/>
+              <a:rPr lang="bg-BG" dirty="0" smtClean="0">
+                <a:solidFill>
+                  <a:schemeClr val="tx1"/>
+                </a:solidFill>
+              </a:rPr>
               <a:t>Тодор Желев</a:t>
             </a:r>
-            <a:endParaRPr lang="bg-BG" dirty="0"/>
+            <a:endParaRPr lang="bg-BG" dirty="0">
+              <a:solidFill>
+                <a:schemeClr val="tx1"/>
+              </a:solidFill>
+            </a:endParaRPr>
           </a:p>
         </p:txBody>
       </p:sp>
@@ -5994,11 +6021,7 @@
             </a:r>
             <a:r>
               <a:rPr lang="bg-BG" dirty="0" smtClean="0"/>
-              <a:t>на потребител се запазват точките, през които е </a:t>
-            </a:r>
-            <a:r>
-              <a:rPr lang="bg-BG" dirty="0" smtClean="0"/>
-              <a:t>минал</a:t>
+              <a:t>на потребител се запазват точките, през които е минал</a:t>
             </a:r>
           </a:p>
           <a:p>
@@ -6006,7 +6029,6 @@
               <a:rPr lang="bg-BG" dirty="0" smtClean="0"/>
               <a:t>Запазените точки се свързват последователно с линии</a:t>
             </a:r>
-            <a:endParaRPr lang="bg-BG" dirty="0" smtClean="0"/>
           </a:p>
           <a:p>
             <a:r>
@@ -6023,15 +6045,7 @@
             </a:r>
             <a:r>
               <a:rPr lang="bg-BG" dirty="0" smtClean="0"/>
-              <a:t>вета на тези </a:t>
-            </a:r>
-            <a:r>
-              <a:rPr lang="bg-BG" dirty="0" smtClean="0"/>
-              <a:t>точки и точките, генерирани от линиите, </a:t>
-            </a:r>
-            <a:r>
-              <a:rPr lang="bg-BG" dirty="0" smtClean="0"/>
-              <a:t>става бял, което симулира изтриване</a:t>
+              <a:t>вета на тези точки и точките, генерирани от линиите, става бял, което симулира изтриване</a:t>
             </a:r>
             <a:endParaRPr lang="bg-BG" dirty="0"/>
           </a:p>
@@ -6090,8 +6104,8 @@
           </a:p>
         </p:txBody>
       </p:sp>
-      <mc:AlternateContent xmlns:mc="http://schemas.openxmlformats.org/markup-compatibility/2006">
-        <mc:Choice xmlns:a14="http://schemas.microsoft.com/office/drawing/2010/main" Requires="a14">
+      <mc:AlternateContent xmlns:mc="http://schemas.openxmlformats.org/markup-compatibility/2006" xmlns:a14="http://schemas.microsoft.com/office/drawing/2010/main">
+        <mc:Choice Requires="a14">
           <p:sp>
             <p:nvSpPr>
               <p:cNvPr id="3" name="Content Placeholder 2"/>
@@ -6362,11 +6376,7 @@
                 </a14:m>
                 <a:r>
                   <a:rPr lang="bg-BG" dirty="0" smtClean="0"/>
-                  <a:t> е главн</a:t>
-                </a:r>
-                <a:r>
-                  <a:rPr lang="bg-BG" dirty="0" smtClean="0"/>
-                  <a:t>ата полуос</a:t>
+                  <a:t> е главната полуос</a:t>
                 </a:r>
               </a:p>
               <a:p>
@@ -6386,13 +6396,8 @@
                 </a:r>
                 <a:r>
                   <a:rPr lang="bg-BG" dirty="0" smtClean="0"/>
-                  <a:t>е </a:t>
+                  <a:t>е малката полуос</a:t>
                 </a:r>
-                <a:r>
-                  <a:rPr lang="bg-BG" dirty="0" smtClean="0"/>
-                  <a:t>малката полуос</a:t>
-                </a:r>
-                <a:endParaRPr lang="bg-BG" dirty="0" smtClean="0"/>
               </a:p>
               <a:p>
                 <a:endParaRPr lang="bg-BG" dirty="0" smtClean="0"/>
@@ -6400,11 +6405,7 @@
               <a:p>
                 <a:r>
                   <a:rPr lang="bg-BG" dirty="0" smtClean="0"/>
-                  <a:t>Първо се изчертава горната част на елипсата, след това </a:t>
-                </a:r>
-                <a:r>
-                  <a:rPr lang="bg-BG" dirty="0" smtClean="0"/>
-                  <a:t>долната</a:t>
+                  <a:t>Първо се изчертава горната част на елипсата, след това долната</a:t>
                 </a:r>
               </a:p>
               <a:p>
@@ -6417,7 +6418,7 @@
             </p:txBody>
           </p:sp>
         </mc:Choice>
-        <mc:Fallback>
+        <mc:Fallback xmlns="">
           <p:sp>
             <p:nvSpPr>
               <p:cNvPr id="3" name="Content Placeholder 2"/>
@@ -6567,11 +6568,7 @@
             </a:r>
             <a:r>
               <a:rPr lang="bg-BG" dirty="0" smtClean="0"/>
-              <a:t>се запазват две </a:t>
-            </a:r>
-            <a:r>
-              <a:rPr lang="bg-BG" dirty="0" smtClean="0"/>
-              <a:t>точки (</a:t>
+              <a:t>се запазват две точки (</a:t>
             </a:r>
             <a:r>
               <a:rPr lang="en-US" dirty="0" smtClean="0"/>
@@ -6579,15 +6576,7 @@
             </a:r>
             <a:r>
               <a:rPr lang="bg-BG" dirty="0" smtClean="0"/>
-              <a:t>, </a:t>
-            </a:r>
-            <a:r>
-              <a:rPr lang="bg-BG" dirty="0" smtClean="0"/>
-              <a:t>които дефинират правоъгълна </a:t>
-            </a:r>
-            <a:r>
-              <a:rPr lang="bg-BG" dirty="0" smtClean="0"/>
-              <a:t>област</a:t>
+              <a:t>, които дефинират правоъгълна област</a:t>
             </a:r>
             <a:endParaRPr lang="en-US" dirty="0" smtClean="0"/>
           </a:p>
@@ -6612,11 +6601,7 @@
           <a:p>
             <a:r>
               <a:rPr lang="bg-BG" dirty="0" smtClean="0"/>
-              <a:t>Тази правоъгълна област от точки се запазва и се използва в другите </a:t>
-            </a:r>
-            <a:r>
-              <a:rPr lang="bg-BG" dirty="0" smtClean="0"/>
-              <a:t>инструменти</a:t>
+              <a:t>Тази правоъгълна област от точки се запазва и се използва в другите инструменти</a:t>
             </a:r>
             <a:endParaRPr lang="en-US" dirty="0" smtClean="0"/>
           </a:p>
@@ -6708,8 +6693,8 @@
           </a:p>
         </p:txBody>
       </p:sp>
-      <mc:AlternateContent xmlns:mc="http://schemas.openxmlformats.org/markup-compatibility/2006">
-        <mc:Choice xmlns:a14="http://schemas.microsoft.com/office/drawing/2010/main" Requires="a14">
+      <mc:AlternateContent xmlns:mc="http://schemas.openxmlformats.org/markup-compatibility/2006" xmlns:a14="http://schemas.microsoft.com/office/drawing/2010/main">
+        <mc:Choice Requires="a14">
           <p:sp>
             <p:nvSpPr>
               <p:cNvPr id="3" name="Content Placeholder 2"/>
@@ -6891,25 +6876,15 @@
                 <a:pPr lvl="1"/>
                 <a:r>
                   <a:rPr lang="bg-BG" dirty="0" smtClean="0"/>
-                  <a:t>Транслираме всяка избрана точка </a:t>
+                  <a:t>Транслираме всяка избрана точка на базата на центъра на областта до началото на координатната система</a:t>
                 </a:r>
-                <a:r>
-                  <a:rPr lang="bg-BG" dirty="0" smtClean="0"/>
-                  <a:t>на базата на центъра на областта до началото на координатната система</a:t>
-                </a:r>
-                <a:endParaRPr lang="bg-BG" dirty="0" smtClean="0"/>
               </a:p>
               <a:p>
                 <a:pPr lvl="1"/>
                 <a:r>
                   <a:rPr lang="bg-BG" dirty="0" smtClean="0"/>
-                  <a:t>Прилагаме матрицата за </a:t>
+                  <a:t>Прилагаме матрицата за завъртане върху всяка селектирана точка</a:t>
                 </a:r>
-                <a:r>
-                  <a:rPr lang="bg-BG" dirty="0" smtClean="0"/>
-                  <a:t>завъртане върху всяка селектирана точка</a:t>
-                </a:r>
-                <a:endParaRPr lang="bg-BG" dirty="0" smtClean="0"/>
               </a:p>
               <a:p>
                 <a:pPr lvl="1"/>
@@ -6924,7 +6899,7 @@
             </p:txBody>
           </p:sp>
         </mc:Choice>
-        <mc:Fallback>
+        <mc:Fallback xmlns="">
           <p:sp>
             <p:nvSpPr>
               <p:cNvPr id="3" name="Content Placeholder 2"/>
@@ -7290,6 +7265,64 @@
     <p:extLst>
       <p:ext uri="{BB962C8B-B14F-4D97-AF65-F5344CB8AC3E}">
         <p14:creationId xmlns:p14="http://schemas.microsoft.com/office/powerpoint/2010/main" val="1272263761"/>
+      </p:ext>
+    </p:extLst>
+  </p:cSld>
+  <p:clrMapOvr>
+    <a:masterClrMapping/>
+  </p:clrMapOvr>
+</p:sld>
+</file>
+
+<file path=ppt/slides/slide15.xml><?xml version="1.0" encoding="utf-8"?>
+<p:sld xmlns:a="http://schemas.openxmlformats.org/drawingml/2006/main" xmlns:r="http://schemas.openxmlformats.org/officeDocument/2006/relationships" xmlns:p="http://schemas.openxmlformats.org/presentationml/2006/main">
+  <p:cSld>
+    <p:spTree>
+      <p:nvGrpSpPr>
+        <p:cNvPr id="1" name=""/>
+        <p:cNvGrpSpPr/>
+        <p:nvPr/>
+      </p:nvGrpSpPr>
+      <p:grpSpPr>
+        <a:xfrm>
+          <a:off x="0" y="0"/>
+          <a:ext cx="0" cy="0"/>
+          <a:chOff x="0" y="0"/>
+          <a:chExt cx="0" cy="0"/>
+        </a:xfrm>
+      </p:grpSpPr>
+      <p:sp>
+        <p:nvSpPr>
+          <p:cNvPr id="2" name="Title 1"/>
+          <p:cNvSpPr>
+            <a:spLocks noGrp="1"/>
+          </p:cNvSpPr>
+          <p:nvPr>
+            <p:ph type="title"/>
+          </p:nvPr>
+        </p:nvSpPr>
+        <p:spPr>
+          <a:xfrm>
+            <a:off x="1997176" y="3119887"/>
+            <a:ext cx="6974296" cy="675736"/>
+          </a:xfrm>
+        </p:spPr>
+        <p:txBody>
+          <a:bodyPr/>
+          <a:lstStyle/>
+          <a:p>
+            <a:r>
+              <a:rPr lang="bg-BG" b="1" dirty="0" smtClean="0"/>
+              <a:t>Благодарим Ви за вниманието</a:t>
+            </a:r>
+            <a:endParaRPr lang="bg-BG" b="1" dirty="0"/>
+          </a:p>
+        </p:txBody>
+      </p:sp>
+    </p:spTree>
+    <p:extLst>
+      <p:ext uri="{BB962C8B-B14F-4D97-AF65-F5344CB8AC3E}">
+        <p14:creationId xmlns:p14="http://schemas.microsoft.com/office/powerpoint/2010/main" val="562556728"/>
       </p:ext>
     </p:extLst>
   </p:cSld>

</xml_diff>

<commit_message>
- changes to the presentation
</commit_message>
<xml_diff>
--- a/presentation/PresentationFinal.pptx
+++ b/presentation/PresentationFinal.pptx
@@ -4,22 +4,27 @@
   <p:sldMasterIdLst>
     <p:sldMasterId id="2147483677" r:id="rId1"/>
   </p:sldMasterIdLst>
+  <p:notesMasterIdLst>
+    <p:notesMasterId r:id="rId19"/>
+  </p:notesMasterIdLst>
   <p:sldIdLst>
     <p:sldId id="256" r:id="rId2"/>
-    <p:sldId id="257" r:id="rId3"/>
-    <p:sldId id="258" r:id="rId4"/>
-    <p:sldId id="259" r:id="rId5"/>
-    <p:sldId id="260" r:id="rId6"/>
-    <p:sldId id="261" r:id="rId7"/>
-    <p:sldId id="262" r:id="rId8"/>
-    <p:sldId id="263" r:id="rId9"/>
-    <p:sldId id="264" r:id="rId10"/>
-    <p:sldId id="265" r:id="rId11"/>
-    <p:sldId id="266" r:id="rId12"/>
-    <p:sldId id="267" r:id="rId13"/>
-    <p:sldId id="268" r:id="rId14"/>
-    <p:sldId id="269" r:id="rId15"/>
-    <p:sldId id="270" r:id="rId16"/>
+    <p:sldId id="272" r:id="rId3"/>
+    <p:sldId id="273" r:id="rId4"/>
+    <p:sldId id="257" r:id="rId5"/>
+    <p:sldId id="258" r:id="rId6"/>
+    <p:sldId id="259" r:id="rId7"/>
+    <p:sldId id="260" r:id="rId8"/>
+    <p:sldId id="261" r:id="rId9"/>
+    <p:sldId id="262" r:id="rId10"/>
+    <p:sldId id="263" r:id="rId11"/>
+    <p:sldId id="264" r:id="rId12"/>
+    <p:sldId id="265" r:id="rId13"/>
+    <p:sldId id="266" r:id="rId14"/>
+    <p:sldId id="267" r:id="rId15"/>
+    <p:sldId id="268" r:id="rId16"/>
+    <p:sldId id="269" r:id="rId17"/>
+    <p:sldId id="270" r:id="rId18"/>
   </p:sldIdLst>
   <p:sldSz cx="12192000" cy="6858000"/>
   <p:notesSz cx="6858000" cy="9144000"/>
@@ -124,6 +129,440 @@
     </p:ext>
   </p:extLst>
 </p:presentation>
+</file>
+
+<file path=ppt/notesMasters/notesMaster1.xml><?xml version="1.0" encoding="utf-8"?>
+<p:notesMaster xmlns:a="http://schemas.openxmlformats.org/drawingml/2006/main" xmlns:r="http://schemas.openxmlformats.org/officeDocument/2006/relationships" xmlns:p="http://schemas.openxmlformats.org/presentationml/2006/main">
+  <p:cSld>
+    <p:bg>
+      <p:bgRef idx="1001">
+        <a:schemeClr val="bg1"/>
+      </p:bgRef>
+    </p:bg>
+    <p:spTree>
+      <p:nvGrpSpPr>
+        <p:cNvPr id="1" name=""/>
+        <p:cNvGrpSpPr/>
+        <p:nvPr/>
+      </p:nvGrpSpPr>
+      <p:grpSpPr>
+        <a:xfrm>
+          <a:off x="0" y="0"/>
+          <a:ext cx="0" cy="0"/>
+          <a:chOff x="0" y="0"/>
+          <a:chExt cx="0" cy="0"/>
+        </a:xfrm>
+      </p:grpSpPr>
+      <p:sp>
+        <p:nvSpPr>
+          <p:cNvPr id="2" name="Header Placeholder 1"/>
+          <p:cNvSpPr>
+            <a:spLocks noGrp="1"/>
+          </p:cNvSpPr>
+          <p:nvPr>
+            <p:ph type="hdr" sz="quarter"/>
+          </p:nvPr>
+        </p:nvSpPr>
+        <p:spPr>
+          <a:xfrm>
+            <a:off x="0" y="0"/>
+            <a:ext cx="2971800" cy="458788"/>
+          </a:xfrm>
+          <a:prstGeom prst="rect">
+            <a:avLst/>
+          </a:prstGeom>
+        </p:spPr>
+        <p:txBody>
+          <a:bodyPr vert="horz" lIns="91440" tIns="45720" rIns="91440" bIns="45720" rtlCol="0"/>
+          <a:lstStyle>
+            <a:lvl1pPr algn="l">
+              <a:defRPr sz="1200"/>
+            </a:lvl1pPr>
+          </a:lstStyle>
+          <a:p>
+            <a:endParaRPr lang="bg-BG"/>
+          </a:p>
+        </p:txBody>
+      </p:sp>
+      <p:sp>
+        <p:nvSpPr>
+          <p:cNvPr id="3" name="Date Placeholder 2"/>
+          <p:cNvSpPr>
+            <a:spLocks noGrp="1"/>
+          </p:cNvSpPr>
+          <p:nvPr>
+            <p:ph type="dt" idx="1"/>
+          </p:nvPr>
+        </p:nvSpPr>
+        <p:spPr>
+          <a:xfrm>
+            <a:off x="3884613" y="0"/>
+            <a:ext cx="2971800" cy="458788"/>
+          </a:xfrm>
+          <a:prstGeom prst="rect">
+            <a:avLst/>
+          </a:prstGeom>
+        </p:spPr>
+        <p:txBody>
+          <a:bodyPr vert="horz" lIns="91440" tIns="45720" rIns="91440" bIns="45720" rtlCol="0"/>
+          <a:lstStyle>
+            <a:lvl1pPr algn="r">
+              <a:defRPr sz="1200"/>
+            </a:lvl1pPr>
+          </a:lstStyle>
+          <a:p>
+            <a:fld id="{4534FD1E-2E55-45DB-BC49-7DC3DD18B3DD}" type="datetimeFigureOut">
+              <a:rPr lang="bg-BG" smtClean="0"/>
+              <a:t>24.5.2015 г.</a:t>
+            </a:fld>
+            <a:endParaRPr lang="bg-BG"/>
+          </a:p>
+        </p:txBody>
+      </p:sp>
+      <p:sp>
+        <p:nvSpPr>
+          <p:cNvPr id="4" name="Slide Image Placeholder 3"/>
+          <p:cNvSpPr>
+            <a:spLocks noGrp="1" noRot="1" noChangeAspect="1"/>
+          </p:cNvSpPr>
+          <p:nvPr>
+            <p:ph type="sldImg" idx="2"/>
+          </p:nvPr>
+        </p:nvSpPr>
+        <p:spPr>
+          <a:xfrm>
+            <a:off x="685800" y="1143000"/>
+            <a:ext cx="5486400" cy="3086100"/>
+          </a:xfrm>
+          <a:prstGeom prst="rect">
+            <a:avLst/>
+          </a:prstGeom>
+          <a:noFill/>
+          <a:ln w="12700">
+            <a:solidFill>
+              <a:prstClr val="black"/>
+            </a:solidFill>
+          </a:ln>
+        </p:spPr>
+        <p:txBody>
+          <a:bodyPr vert="horz" lIns="91440" tIns="45720" rIns="91440" bIns="45720" rtlCol="0" anchor="ctr"/>
+          <a:lstStyle/>
+          <a:p>
+            <a:endParaRPr lang="bg-BG"/>
+          </a:p>
+        </p:txBody>
+      </p:sp>
+      <p:sp>
+        <p:nvSpPr>
+          <p:cNvPr id="5" name="Notes Placeholder 4"/>
+          <p:cNvSpPr>
+            <a:spLocks noGrp="1"/>
+          </p:cNvSpPr>
+          <p:nvPr>
+            <p:ph type="body" sz="quarter" idx="3"/>
+          </p:nvPr>
+        </p:nvSpPr>
+        <p:spPr>
+          <a:xfrm>
+            <a:off x="685800" y="4400550"/>
+            <a:ext cx="5486400" cy="3600450"/>
+          </a:xfrm>
+          <a:prstGeom prst="rect">
+            <a:avLst/>
+          </a:prstGeom>
+        </p:spPr>
+        <p:txBody>
+          <a:bodyPr vert="horz" lIns="91440" tIns="45720" rIns="91440" bIns="45720" rtlCol="0"/>
+          <a:lstStyle/>
+          <a:p>
+            <a:pPr lvl="0"/>
+            <a:r>
+              <a:rPr lang="en-US" smtClean="0"/>
+              <a:t>Click to edit Master text styles</a:t>
+            </a:r>
+          </a:p>
+          <a:p>
+            <a:pPr lvl="1"/>
+            <a:r>
+              <a:rPr lang="en-US" smtClean="0"/>
+              <a:t>Second level</a:t>
+            </a:r>
+          </a:p>
+          <a:p>
+            <a:pPr lvl="2"/>
+            <a:r>
+              <a:rPr lang="en-US" smtClean="0"/>
+              <a:t>Third level</a:t>
+            </a:r>
+          </a:p>
+          <a:p>
+            <a:pPr lvl="3"/>
+            <a:r>
+              <a:rPr lang="en-US" smtClean="0"/>
+              <a:t>Fourth level</a:t>
+            </a:r>
+          </a:p>
+          <a:p>
+            <a:pPr lvl="4"/>
+            <a:r>
+              <a:rPr lang="en-US" smtClean="0"/>
+              <a:t>Fifth level</a:t>
+            </a:r>
+            <a:endParaRPr lang="bg-BG"/>
+          </a:p>
+        </p:txBody>
+      </p:sp>
+      <p:sp>
+        <p:nvSpPr>
+          <p:cNvPr id="6" name="Footer Placeholder 5"/>
+          <p:cNvSpPr>
+            <a:spLocks noGrp="1"/>
+          </p:cNvSpPr>
+          <p:nvPr>
+            <p:ph type="ftr" sz="quarter" idx="4"/>
+          </p:nvPr>
+        </p:nvSpPr>
+        <p:spPr>
+          <a:xfrm>
+            <a:off x="0" y="8685213"/>
+            <a:ext cx="2971800" cy="458787"/>
+          </a:xfrm>
+          <a:prstGeom prst="rect">
+            <a:avLst/>
+          </a:prstGeom>
+        </p:spPr>
+        <p:txBody>
+          <a:bodyPr vert="horz" lIns="91440" tIns="45720" rIns="91440" bIns="45720" rtlCol="0" anchor="b"/>
+          <a:lstStyle>
+            <a:lvl1pPr algn="l">
+              <a:defRPr sz="1200"/>
+            </a:lvl1pPr>
+          </a:lstStyle>
+          <a:p>
+            <a:endParaRPr lang="bg-BG"/>
+          </a:p>
+        </p:txBody>
+      </p:sp>
+      <p:sp>
+        <p:nvSpPr>
+          <p:cNvPr id="7" name="Slide Number Placeholder 6"/>
+          <p:cNvSpPr>
+            <a:spLocks noGrp="1"/>
+          </p:cNvSpPr>
+          <p:nvPr>
+            <p:ph type="sldNum" sz="quarter" idx="5"/>
+          </p:nvPr>
+        </p:nvSpPr>
+        <p:spPr>
+          <a:xfrm>
+            <a:off x="3884613" y="8685213"/>
+            <a:ext cx="2971800" cy="458787"/>
+          </a:xfrm>
+          <a:prstGeom prst="rect">
+            <a:avLst/>
+          </a:prstGeom>
+        </p:spPr>
+        <p:txBody>
+          <a:bodyPr vert="horz" lIns="91440" tIns="45720" rIns="91440" bIns="45720" rtlCol="0" anchor="b"/>
+          <a:lstStyle>
+            <a:lvl1pPr algn="r">
+              <a:defRPr sz="1200"/>
+            </a:lvl1pPr>
+          </a:lstStyle>
+          <a:p>
+            <a:fld id="{525AB9EE-66C8-402A-8C30-5392F08F0930}" type="slidenum">
+              <a:rPr lang="bg-BG" smtClean="0"/>
+              <a:t>‹#›</a:t>
+            </a:fld>
+            <a:endParaRPr lang="bg-BG"/>
+          </a:p>
+        </p:txBody>
+      </p:sp>
+    </p:spTree>
+    <p:extLst>
+      <p:ext uri="{BB962C8B-B14F-4D97-AF65-F5344CB8AC3E}">
+        <p14:creationId xmlns:p14="http://schemas.microsoft.com/office/powerpoint/2010/main" val="890745290"/>
+      </p:ext>
+    </p:extLst>
+  </p:cSld>
+  <p:clrMap bg1="lt1" tx1="dk1" bg2="lt2" tx2="dk2" accent1="accent1" accent2="accent2" accent3="accent3" accent4="accent4" accent5="accent5" accent6="accent6" hlink="hlink" folHlink="folHlink"/>
+  <p:notesStyle>
+    <a:lvl1pPr marL="0" algn="l" defTabSz="914400" rtl="0" eaLnBrk="1" latinLnBrk="0" hangingPunct="1">
+      <a:defRPr sz="1200" kern="1200">
+        <a:solidFill>
+          <a:schemeClr val="tx1"/>
+        </a:solidFill>
+        <a:latin typeface="+mn-lt"/>
+        <a:ea typeface="+mn-ea"/>
+        <a:cs typeface="+mn-cs"/>
+      </a:defRPr>
+    </a:lvl1pPr>
+    <a:lvl2pPr marL="457200" algn="l" defTabSz="914400" rtl="0" eaLnBrk="1" latinLnBrk="0" hangingPunct="1">
+      <a:defRPr sz="1200" kern="1200">
+        <a:solidFill>
+          <a:schemeClr val="tx1"/>
+        </a:solidFill>
+        <a:latin typeface="+mn-lt"/>
+        <a:ea typeface="+mn-ea"/>
+        <a:cs typeface="+mn-cs"/>
+      </a:defRPr>
+    </a:lvl2pPr>
+    <a:lvl3pPr marL="914400" algn="l" defTabSz="914400" rtl="0" eaLnBrk="1" latinLnBrk="0" hangingPunct="1">
+      <a:defRPr sz="1200" kern="1200">
+        <a:solidFill>
+          <a:schemeClr val="tx1"/>
+        </a:solidFill>
+        <a:latin typeface="+mn-lt"/>
+        <a:ea typeface="+mn-ea"/>
+        <a:cs typeface="+mn-cs"/>
+      </a:defRPr>
+    </a:lvl3pPr>
+    <a:lvl4pPr marL="1371600" algn="l" defTabSz="914400" rtl="0" eaLnBrk="1" latinLnBrk="0" hangingPunct="1">
+      <a:defRPr sz="1200" kern="1200">
+        <a:solidFill>
+          <a:schemeClr val="tx1"/>
+        </a:solidFill>
+        <a:latin typeface="+mn-lt"/>
+        <a:ea typeface="+mn-ea"/>
+        <a:cs typeface="+mn-cs"/>
+      </a:defRPr>
+    </a:lvl4pPr>
+    <a:lvl5pPr marL="1828800" algn="l" defTabSz="914400" rtl="0" eaLnBrk="1" latinLnBrk="0" hangingPunct="1">
+      <a:defRPr sz="1200" kern="1200">
+        <a:solidFill>
+          <a:schemeClr val="tx1"/>
+        </a:solidFill>
+        <a:latin typeface="+mn-lt"/>
+        <a:ea typeface="+mn-ea"/>
+        <a:cs typeface="+mn-cs"/>
+      </a:defRPr>
+    </a:lvl5pPr>
+    <a:lvl6pPr marL="2286000" algn="l" defTabSz="914400" rtl="0" eaLnBrk="1" latinLnBrk="0" hangingPunct="1">
+      <a:defRPr sz="1200" kern="1200">
+        <a:solidFill>
+          <a:schemeClr val="tx1"/>
+        </a:solidFill>
+        <a:latin typeface="+mn-lt"/>
+        <a:ea typeface="+mn-ea"/>
+        <a:cs typeface="+mn-cs"/>
+      </a:defRPr>
+    </a:lvl6pPr>
+    <a:lvl7pPr marL="2743200" algn="l" defTabSz="914400" rtl="0" eaLnBrk="1" latinLnBrk="0" hangingPunct="1">
+      <a:defRPr sz="1200" kern="1200">
+        <a:solidFill>
+          <a:schemeClr val="tx1"/>
+        </a:solidFill>
+        <a:latin typeface="+mn-lt"/>
+        <a:ea typeface="+mn-ea"/>
+        <a:cs typeface="+mn-cs"/>
+      </a:defRPr>
+    </a:lvl7pPr>
+    <a:lvl8pPr marL="3200400" algn="l" defTabSz="914400" rtl="0" eaLnBrk="1" latinLnBrk="0" hangingPunct="1">
+      <a:defRPr sz="1200" kern="1200">
+        <a:solidFill>
+          <a:schemeClr val="tx1"/>
+        </a:solidFill>
+        <a:latin typeface="+mn-lt"/>
+        <a:ea typeface="+mn-ea"/>
+        <a:cs typeface="+mn-cs"/>
+      </a:defRPr>
+    </a:lvl8pPr>
+    <a:lvl9pPr marL="3657600" algn="l" defTabSz="914400" rtl="0" eaLnBrk="1" latinLnBrk="0" hangingPunct="1">
+      <a:defRPr sz="1200" kern="1200">
+        <a:solidFill>
+          <a:schemeClr val="tx1"/>
+        </a:solidFill>
+        <a:latin typeface="+mn-lt"/>
+        <a:ea typeface="+mn-ea"/>
+        <a:cs typeface="+mn-cs"/>
+      </a:defRPr>
+    </a:lvl9pPr>
+  </p:notesStyle>
+</p:notesMaster>
+</file>
+
+<file path=ppt/notesSlides/notesSlide1.xml><?xml version="1.0" encoding="utf-8"?>
+<p:notes xmlns:a="http://schemas.openxmlformats.org/drawingml/2006/main" xmlns:r="http://schemas.openxmlformats.org/officeDocument/2006/relationships" xmlns:p="http://schemas.openxmlformats.org/presentationml/2006/main">
+  <p:cSld>
+    <p:spTree>
+      <p:nvGrpSpPr>
+        <p:cNvPr id="1" name=""/>
+        <p:cNvGrpSpPr/>
+        <p:nvPr/>
+      </p:nvGrpSpPr>
+      <p:grpSpPr>
+        <a:xfrm>
+          <a:off x="0" y="0"/>
+          <a:ext cx="0" cy="0"/>
+          <a:chOff x="0" y="0"/>
+          <a:chExt cx="0" cy="0"/>
+        </a:xfrm>
+      </p:grpSpPr>
+      <p:sp>
+        <p:nvSpPr>
+          <p:cNvPr id="2" name="Slide Image Placeholder 1"/>
+          <p:cNvSpPr>
+            <a:spLocks noGrp="1" noRot="1" noChangeAspect="1"/>
+          </p:cNvSpPr>
+          <p:nvPr>
+            <p:ph type="sldImg"/>
+          </p:nvPr>
+        </p:nvSpPr>
+        <p:spPr/>
+      </p:sp>
+      <p:sp>
+        <p:nvSpPr>
+          <p:cNvPr id="3" name="Notes Placeholder 2"/>
+          <p:cNvSpPr>
+            <a:spLocks noGrp="1"/>
+          </p:cNvSpPr>
+          <p:nvPr>
+            <p:ph type="body" idx="1"/>
+          </p:nvPr>
+        </p:nvSpPr>
+        <p:spPr/>
+        <p:txBody>
+          <a:bodyPr/>
+          <a:lstStyle/>
+          <a:p>
+            <a:endParaRPr lang="bg-BG" dirty="0"/>
+          </a:p>
+        </p:txBody>
+      </p:sp>
+      <p:sp>
+        <p:nvSpPr>
+          <p:cNvPr id="4" name="Slide Number Placeholder 3"/>
+          <p:cNvSpPr>
+            <a:spLocks noGrp="1"/>
+          </p:cNvSpPr>
+          <p:nvPr>
+            <p:ph type="sldNum" sz="quarter" idx="10"/>
+          </p:nvPr>
+        </p:nvSpPr>
+        <p:spPr/>
+        <p:txBody>
+          <a:bodyPr/>
+          <a:lstStyle/>
+          <a:p>
+            <a:fld id="{EA4A29BA-C2AF-4A37-A2C7-89F86B0D71DA}" type="slidenum">
+              <a:rPr lang="bg-BG" smtClean="0"/>
+              <a:t>3</a:t>
+            </a:fld>
+            <a:endParaRPr lang="bg-BG"/>
+          </a:p>
+        </p:txBody>
+      </p:sp>
+    </p:spTree>
+    <p:extLst>
+      <p:ext uri="{BB962C8B-B14F-4D97-AF65-F5344CB8AC3E}">
+        <p14:creationId xmlns:p14="http://schemas.microsoft.com/office/powerpoint/2010/main" val="822451940"/>
+      </p:ext>
+    </p:extLst>
+  </p:cSld>
+  <p:clrMapOvr>
+    <a:masterClrMapping/>
+  </p:clrMapOvr>
+</p:notes>
 </file>
 
 <file path=ppt/slideLayouts/slideLayout1.xml><?xml version="1.0" encoding="utf-8"?>
@@ -871,7 +1310,7 @@
           <a:p>
             <a:fld id="{C45ACB76-8FC7-4E68-AACA-10A3FA073C9C}" type="datetimeFigureOut">
               <a:rPr lang="bg-BG" smtClean="0"/>
-              <a:t>23.5.2015 г.</a:t>
+              <a:t>24.5.2015 г.</a:t>
             </a:fld>
             <a:endParaRPr lang="bg-BG"/>
           </a:p>
@@ -1122,7 +1561,7 @@
           <a:p>
             <a:fld id="{C45ACB76-8FC7-4E68-AACA-10A3FA073C9C}" type="datetimeFigureOut">
               <a:rPr lang="bg-BG" smtClean="0"/>
-              <a:t>23.5.2015 г.</a:t>
+              <a:t>24.5.2015 г.</a:t>
             </a:fld>
             <a:endParaRPr lang="bg-BG"/>
           </a:p>
@@ -1436,7 +1875,7 @@
           <a:p>
             <a:fld id="{C45ACB76-8FC7-4E68-AACA-10A3FA073C9C}" type="datetimeFigureOut">
               <a:rPr lang="bg-BG" smtClean="0"/>
-              <a:t>23.5.2015 г.</a:t>
+              <a:t>24.5.2015 г.</a:t>
             </a:fld>
             <a:endParaRPr lang="bg-BG"/>
           </a:p>
@@ -1769,7 +2208,7 @@
           <a:p>
             <a:fld id="{C45ACB76-8FC7-4E68-AACA-10A3FA073C9C}" type="datetimeFigureOut">
               <a:rPr lang="bg-BG" smtClean="0"/>
-              <a:t>23.5.2015 г.</a:t>
+              <a:t>24.5.2015 г.</a:t>
             </a:fld>
             <a:endParaRPr lang="bg-BG"/>
           </a:p>
@@ -2083,7 +2522,7 @@
           <a:p>
             <a:fld id="{C45ACB76-8FC7-4E68-AACA-10A3FA073C9C}" type="datetimeFigureOut">
               <a:rPr lang="bg-BG" smtClean="0"/>
-              <a:t>23.5.2015 г.</a:t>
+              <a:t>24.5.2015 г.</a:t>
             </a:fld>
             <a:endParaRPr lang="bg-BG"/>
           </a:p>
@@ -2476,7 +2915,7 @@
           <a:p>
             <a:fld id="{C45ACB76-8FC7-4E68-AACA-10A3FA073C9C}" type="datetimeFigureOut">
               <a:rPr lang="bg-BG" smtClean="0"/>
-              <a:t>23.5.2015 г.</a:t>
+              <a:t>24.5.2015 г.</a:t>
             </a:fld>
             <a:endParaRPr lang="bg-BG"/>
           </a:p>
@@ -2646,7 +3085,7 @@
           <a:p>
             <a:fld id="{C45ACB76-8FC7-4E68-AACA-10A3FA073C9C}" type="datetimeFigureOut">
               <a:rPr lang="bg-BG" smtClean="0"/>
-              <a:t>23.5.2015 г.</a:t>
+              <a:t>24.5.2015 г.</a:t>
             </a:fld>
             <a:endParaRPr lang="bg-BG"/>
           </a:p>
@@ -2826,7 +3265,7 @@
           <a:p>
             <a:fld id="{C45ACB76-8FC7-4E68-AACA-10A3FA073C9C}" type="datetimeFigureOut">
               <a:rPr lang="bg-BG" smtClean="0"/>
-              <a:t>23.5.2015 г.</a:t>
+              <a:t>24.5.2015 г.</a:t>
             </a:fld>
             <a:endParaRPr lang="bg-BG"/>
           </a:p>
@@ -2996,7 +3435,7 @@
           <a:p>
             <a:fld id="{C45ACB76-8FC7-4E68-AACA-10A3FA073C9C}" type="datetimeFigureOut">
               <a:rPr lang="bg-BG" smtClean="0"/>
-              <a:t>23.5.2015 г.</a:t>
+              <a:t>24.5.2015 г.</a:t>
             </a:fld>
             <a:endParaRPr lang="bg-BG"/>
           </a:p>
@@ -3243,7 +3682,7 @@
           <a:p>
             <a:fld id="{C45ACB76-8FC7-4E68-AACA-10A3FA073C9C}" type="datetimeFigureOut">
               <a:rPr lang="bg-BG" smtClean="0"/>
-              <a:t>23.5.2015 г.</a:t>
+              <a:t>24.5.2015 г.</a:t>
             </a:fld>
             <a:endParaRPr lang="bg-BG"/>
           </a:p>
@@ -3475,7 +3914,7 @@
           <a:p>
             <a:fld id="{C45ACB76-8FC7-4E68-AACA-10A3FA073C9C}" type="datetimeFigureOut">
               <a:rPr lang="bg-BG" smtClean="0"/>
-              <a:t>23.5.2015 г.</a:t>
+              <a:t>24.5.2015 г.</a:t>
             </a:fld>
             <a:endParaRPr lang="bg-BG"/>
           </a:p>
@@ -3849,7 +4288,7 @@
           <a:p>
             <a:fld id="{C45ACB76-8FC7-4E68-AACA-10A3FA073C9C}" type="datetimeFigureOut">
               <a:rPr lang="bg-BG" smtClean="0"/>
-              <a:t>23.5.2015 г.</a:t>
+              <a:t>24.5.2015 г.</a:t>
             </a:fld>
             <a:endParaRPr lang="bg-BG"/>
           </a:p>
@@ -3972,7 +4411,7 @@
           <a:p>
             <a:fld id="{C45ACB76-8FC7-4E68-AACA-10A3FA073C9C}" type="datetimeFigureOut">
               <a:rPr lang="bg-BG" smtClean="0"/>
-              <a:t>23.5.2015 г.</a:t>
+              <a:t>24.5.2015 г.</a:t>
             </a:fld>
             <a:endParaRPr lang="bg-BG"/>
           </a:p>
@@ -4067,7 +4506,7 @@
           <a:p>
             <a:fld id="{C45ACB76-8FC7-4E68-AACA-10A3FA073C9C}" type="datetimeFigureOut">
               <a:rPr lang="bg-BG" smtClean="0"/>
-              <a:t>23.5.2015 г.</a:t>
+              <a:t>24.5.2015 г.</a:t>
             </a:fld>
             <a:endParaRPr lang="bg-BG"/>
           </a:p>
@@ -4322,7 +4761,7 @@
           <a:p>
             <a:fld id="{C45ACB76-8FC7-4E68-AACA-10A3FA073C9C}" type="datetimeFigureOut">
               <a:rPr lang="bg-BG" smtClean="0"/>
-              <a:t>23.5.2015 г.</a:t>
+              <a:t>24.5.2015 г.</a:t>
             </a:fld>
             <a:endParaRPr lang="bg-BG"/>
           </a:p>
@@ -4627,7 +5066,7 @@
           <a:p>
             <a:fld id="{C45ACB76-8FC7-4E68-AACA-10A3FA073C9C}" type="datetimeFigureOut">
               <a:rPr lang="bg-BG" smtClean="0"/>
-              <a:t>23.5.2015 г.</a:t>
+              <a:t>24.5.2015 г.</a:t>
             </a:fld>
             <a:endParaRPr lang="bg-BG"/>
           </a:p>
@@ -5329,7 +5768,7 @@
           <a:p>
             <a:fld id="{C45ACB76-8FC7-4E68-AACA-10A3FA073C9C}" type="datetimeFigureOut">
               <a:rPr lang="bg-BG" smtClean="0"/>
-              <a:t>23.5.2015 г.</a:t>
+              <a:t>24.5.2015 г.</a:t>
             </a:fld>
             <a:endParaRPr lang="bg-BG"/>
           </a:p>
@@ -5981,6 +6420,182 @@
           <a:lstStyle/>
           <a:p>
             <a:r>
+              <a:rPr lang="bg-BG" dirty="0"/>
+              <a:t>Слоеве</a:t>
+            </a:r>
+          </a:p>
+        </p:txBody>
+      </p:sp>
+      <p:pic>
+        <p:nvPicPr>
+          <p:cNvPr id="6" name="Content Placeholder 5"/>
+          <p:cNvPicPr>
+            <a:picLocks noGrp="1" noChangeAspect="1"/>
+          </p:cNvPicPr>
+          <p:nvPr>
+            <p:ph idx="1"/>
+          </p:nvPr>
+        </p:nvPicPr>
+        <p:blipFill>
+          <a:blip r:embed="rId2">
+            <a:extLst>
+              <a:ext uri="{28A0092B-C50C-407E-A947-70E740481C1C}">
+                <a14:useLocalDpi xmlns:a14="http://schemas.microsoft.com/office/drawing/2010/main" val="0"/>
+              </a:ext>
+            </a:extLst>
+          </a:blip>
+          <a:stretch>
+            <a:fillRect/>
+          </a:stretch>
+        </p:blipFill>
+        <p:spPr>
+          <a:xfrm>
+            <a:off x="677863" y="2757327"/>
+            <a:ext cx="8596312" cy="2687958"/>
+          </a:xfrm>
+        </p:spPr>
+      </p:pic>
+    </p:spTree>
+    <p:extLst>
+      <p:ext uri="{BB962C8B-B14F-4D97-AF65-F5344CB8AC3E}">
+        <p14:creationId xmlns:p14="http://schemas.microsoft.com/office/powerpoint/2010/main" val="1769117117"/>
+      </p:ext>
+    </p:extLst>
+  </p:cSld>
+  <p:clrMapOvr>
+    <a:masterClrMapping/>
+  </p:clrMapOvr>
+  <p:timing>
+    <p:tnLst>
+      <p:par>
+        <p:cTn id="1" dur="indefinite" restart="never" nodeType="tmRoot"/>
+      </p:par>
+    </p:tnLst>
+  </p:timing>
+</p:sld>
+</file>
+
+<file path=ppt/slides/slide11.xml><?xml version="1.0" encoding="utf-8"?>
+<p:sld xmlns:a="http://schemas.openxmlformats.org/drawingml/2006/main" xmlns:r="http://schemas.openxmlformats.org/officeDocument/2006/relationships" xmlns:p="http://schemas.openxmlformats.org/presentationml/2006/main">
+  <p:cSld>
+    <p:spTree>
+      <p:nvGrpSpPr>
+        <p:cNvPr id="1" name=""/>
+        <p:cNvGrpSpPr/>
+        <p:nvPr/>
+      </p:nvGrpSpPr>
+      <p:grpSpPr>
+        <a:xfrm>
+          <a:off x="0" y="0"/>
+          <a:ext cx="0" cy="0"/>
+          <a:chOff x="0" y="0"/>
+          <a:chExt cx="0" cy="0"/>
+        </a:xfrm>
+      </p:grpSpPr>
+      <p:sp>
+        <p:nvSpPr>
+          <p:cNvPr id="2" name="Title 1"/>
+          <p:cNvSpPr>
+            <a:spLocks noGrp="1"/>
+          </p:cNvSpPr>
+          <p:nvPr>
+            <p:ph type="title"/>
+          </p:nvPr>
+        </p:nvSpPr>
+        <p:spPr/>
+        <p:txBody>
+          <a:bodyPr/>
+          <a:lstStyle/>
+          <a:p>
+            <a:r>
+              <a:rPr lang="bg-BG" dirty="0"/>
+              <a:t>Слоеве</a:t>
+            </a:r>
+          </a:p>
+        </p:txBody>
+      </p:sp>
+      <p:pic>
+        <p:nvPicPr>
+          <p:cNvPr id="6" name="Content Placeholder 5"/>
+          <p:cNvPicPr>
+            <a:picLocks noGrp="1" noChangeAspect="1"/>
+          </p:cNvPicPr>
+          <p:nvPr>
+            <p:ph idx="1"/>
+          </p:nvPr>
+        </p:nvPicPr>
+        <p:blipFill>
+          <a:blip r:embed="rId2">
+            <a:extLst>
+              <a:ext uri="{28A0092B-C50C-407E-A947-70E740481C1C}">
+                <a14:useLocalDpi xmlns:a14="http://schemas.microsoft.com/office/drawing/2010/main" val="0"/>
+              </a:ext>
+            </a:extLst>
+          </a:blip>
+          <a:stretch>
+            <a:fillRect/>
+          </a:stretch>
+        </p:blipFill>
+        <p:spPr>
+          <a:xfrm>
+            <a:off x="677863" y="2487910"/>
+            <a:ext cx="8596312" cy="3226792"/>
+          </a:xfrm>
+        </p:spPr>
+      </p:pic>
+    </p:spTree>
+    <p:extLst>
+      <p:ext uri="{BB962C8B-B14F-4D97-AF65-F5344CB8AC3E}">
+        <p14:creationId xmlns:p14="http://schemas.microsoft.com/office/powerpoint/2010/main" val="4092524987"/>
+      </p:ext>
+    </p:extLst>
+  </p:cSld>
+  <p:clrMapOvr>
+    <a:masterClrMapping/>
+  </p:clrMapOvr>
+  <p:timing>
+    <p:tnLst>
+      <p:par>
+        <p:cTn id="1" dur="indefinite" restart="never" nodeType="tmRoot"/>
+      </p:par>
+    </p:tnLst>
+  </p:timing>
+</p:sld>
+</file>
+
+<file path=ppt/slides/slide12.xml><?xml version="1.0" encoding="utf-8"?>
+<p:sld xmlns:a="http://schemas.openxmlformats.org/drawingml/2006/main" xmlns:r="http://schemas.openxmlformats.org/officeDocument/2006/relationships" xmlns:p="http://schemas.openxmlformats.org/presentationml/2006/main">
+  <p:cSld>
+    <p:spTree>
+      <p:nvGrpSpPr>
+        <p:cNvPr id="1" name=""/>
+        <p:cNvGrpSpPr/>
+        <p:nvPr/>
+      </p:nvGrpSpPr>
+      <p:grpSpPr>
+        <a:xfrm>
+          <a:off x="0" y="0"/>
+          <a:ext cx="0" cy="0"/>
+          <a:chOff x="0" y="0"/>
+          <a:chExt cx="0" cy="0"/>
+        </a:xfrm>
+      </p:grpSpPr>
+      <p:sp>
+        <p:nvSpPr>
+          <p:cNvPr id="2" name="Title 1"/>
+          <p:cNvSpPr>
+            <a:spLocks noGrp="1"/>
+          </p:cNvSpPr>
+          <p:nvPr>
+            <p:ph type="title"/>
+          </p:nvPr>
+        </p:nvSpPr>
+        <p:spPr/>
+        <p:txBody>
+          <a:bodyPr/>
+          <a:lstStyle/>
+          <a:p>
+            <a:r>
               <a:rPr lang="bg-BG" dirty="0" smtClean="0"/>
               <a:t>Гума</a:t>
             </a:r>
@@ -6064,7 +6679,7 @@
 </p:sld>
 </file>
 
-<file path=ppt/slides/slide11.xml><?xml version="1.0" encoding="utf-8"?>
+<file path=ppt/slides/slide13.xml><?xml version="1.0" encoding="utf-8"?>
 <p:sld xmlns:a="http://schemas.openxmlformats.org/drawingml/2006/main" xmlns:r="http://schemas.openxmlformats.org/officeDocument/2006/relationships" xmlns:p="http://schemas.openxmlformats.org/presentationml/2006/main">
   <p:cSld>
     <p:spTree>
@@ -6495,7 +7110,7 @@
 </p:sld>
 </file>
 
-<file path=ppt/slides/slide12.xml><?xml version="1.0" encoding="utf-8"?>
+<file path=ppt/slides/slide14.xml><?xml version="1.0" encoding="utf-8"?>
 <p:sld xmlns:a="http://schemas.openxmlformats.org/drawingml/2006/main" xmlns:r="http://schemas.openxmlformats.org/officeDocument/2006/relationships" xmlns:p="http://schemas.openxmlformats.org/presentationml/2006/main">
   <p:cSld>
     <p:spTree>
@@ -6653,7 +7268,7 @@
 </p:sld>
 </file>
 
-<file path=ppt/slides/slide13.xml><?xml version="1.0" encoding="utf-8"?>
+<file path=ppt/slides/slide15.xml><?xml version="1.0" encoding="utf-8"?>
 <p:sld xmlns:a="http://schemas.openxmlformats.org/drawingml/2006/main" xmlns:r="http://schemas.openxmlformats.org/officeDocument/2006/relationships" xmlns:p="http://schemas.openxmlformats.org/presentationml/2006/main">
   <p:cSld>
     <p:spTree>
@@ -6950,7 +7565,7 @@
 </p:sld>
 </file>
 
-<file path=ppt/slides/slide14.xml><?xml version="1.0" encoding="utf-8"?>
+<file path=ppt/slides/slide16.xml><?xml version="1.0" encoding="utf-8"?>
 <p:sld xmlns:a="http://schemas.openxmlformats.org/drawingml/2006/main" xmlns:r="http://schemas.openxmlformats.org/officeDocument/2006/relationships" xmlns:p="http://schemas.openxmlformats.org/presentationml/2006/main">
   <p:cSld>
     <p:spTree>
@@ -7274,7 +7889,7 @@
 </p:sld>
 </file>
 
-<file path=ppt/slides/slide15.xml><?xml version="1.0" encoding="utf-8"?>
+<file path=ppt/slides/slide17.xml><?xml version="1.0" encoding="utf-8"?>
 <p:sld xmlns:a="http://schemas.openxmlformats.org/drawingml/2006/main" xmlns:r="http://schemas.openxmlformats.org/officeDocument/2006/relationships" xmlns:p="http://schemas.openxmlformats.org/presentationml/2006/main">
   <p:cSld>
     <p:spTree>
@@ -7333,6 +7948,474 @@
 </file>
 
 <file path=ppt/slides/slide2.xml><?xml version="1.0" encoding="utf-8"?>
+<p:sld xmlns:a="http://schemas.openxmlformats.org/drawingml/2006/main" xmlns:r="http://schemas.openxmlformats.org/officeDocument/2006/relationships" xmlns:p="http://schemas.openxmlformats.org/presentationml/2006/main">
+  <p:cSld>
+    <p:spTree>
+      <p:nvGrpSpPr>
+        <p:cNvPr id="1" name=""/>
+        <p:cNvGrpSpPr/>
+        <p:nvPr/>
+      </p:nvGrpSpPr>
+      <p:grpSpPr>
+        <a:xfrm>
+          <a:off x="0" y="0"/>
+          <a:ext cx="0" cy="0"/>
+          <a:chOff x="0" y="0"/>
+          <a:chExt cx="0" cy="0"/>
+        </a:xfrm>
+      </p:grpSpPr>
+      <p:sp>
+        <p:nvSpPr>
+          <p:cNvPr id="2" name="Title 1"/>
+          <p:cNvSpPr>
+            <a:spLocks noGrp="1"/>
+          </p:cNvSpPr>
+          <p:nvPr>
+            <p:ph type="title"/>
+          </p:nvPr>
+        </p:nvSpPr>
+        <p:spPr/>
+        <p:txBody>
+          <a:bodyPr/>
+          <a:lstStyle/>
+          <a:p>
+            <a:r>
+              <a:rPr lang="bg-BG" b="1" dirty="0" smtClean="0">
+                <a:effectLst>
+                  <a:outerShdw blurRad="38100" dist="38100" dir="2700000" algn="tl">
+                    <a:srgbClr val="000000">
+                      <a:alpha val="43137"/>
+                    </a:srgbClr>
+                  </a:outerShdw>
+                </a:effectLst>
+              </a:rPr>
+              <a:t>Криви на Безие</a:t>
+            </a:r>
+            <a:endParaRPr lang="bg-BG" b="1" dirty="0">
+              <a:effectLst>
+                <a:outerShdw blurRad="38100" dist="38100" dir="2700000" algn="tl">
+                  <a:srgbClr val="000000">
+                    <a:alpha val="43137"/>
+                  </a:srgbClr>
+                </a:outerShdw>
+              </a:effectLst>
+            </a:endParaRPr>
+          </a:p>
+        </p:txBody>
+      </p:sp>
+      <p:sp>
+        <p:nvSpPr>
+          <p:cNvPr id="3" name="Content Placeholder 2"/>
+          <p:cNvSpPr>
+            <a:spLocks noGrp="1"/>
+          </p:cNvSpPr>
+          <p:nvPr>
+            <p:ph idx="1"/>
+          </p:nvPr>
+        </p:nvSpPr>
+        <p:spPr/>
+        <p:txBody>
+          <a:bodyPr/>
+          <a:lstStyle/>
+          <a:p>
+            <a:r>
+              <a:rPr lang="ru-RU" dirty="0"/>
+              <a:t>Кривите на Безие представляват полиномни параметрични криви, т.е. координатните функции на радиус-вектора на произволна точка от кривата са полиноми на един реален аргумент. </a:t>
+            </a:r>
+            <a:endParaRPr lang="ru-RU" dirty="0" smtClean="0"/>
+          </a:p>
+          <a:p>
+            <a:r>
+              <a:rPr lang="ru-RU" dirty="0"/>
+              <a:t>Степента на кривата на Безие се определя от степента на </a:t>
+            </a:r>
+            <a:r>
+              <a:rPr lang="ru-RU" dirty="0" smtClean="0"/>
+              <a:t>полиномите </a:t>
+            </a:r>
+            <a:r>
+              <a:rPr lang="ru-RU" dirty="0"/>
+              <a:t>на </a:t>
+            </a:r>
+            <a:r>
+              <a:rPr lang="ru-RU" dirty="0" smtClean="0"/>
+              <a:t>Берщайн. </a:t>
+            </a:r>
+            <a:endParaRPr lang="en-US" dirty="0" smtClean="0"/>
+          </a:p>
+          <a:p>
+            <a:r>
+              <a:rPr lang="ru-RU" dirty="0" smtClean="0"/>
+              <a:t>Всяка </a:t>
+            </a:r>
+            <a:r>
+              <a:rPr lang="ru-RU" dirty="0"/>
+              <a:t>крива на Безие минава през първата и последната си </a:t>
+            </a:r>
+            <a:r>
+              <a:rPr lang="ru-RU" dirty="0" smtClean="0"/>
+              <a:t>контролна точка.</a:t>
+            </a:r>
+          </a:p>
+        </p:txBody>
+      </p:sp>
+    </p:spTree>
+    <p:extLst>
+      <p:ext uri="{BB962C8B-B14F-4D97-AF65-F5344CB8AC3E}">
+        <p14:creationId xmlns:p14="http://schemas.microsoft.com/office/powerpoint/2010/main" val="3643249865"/>
+      </p:ext>
+    </p:extLst>
+  </p:cSld>
+  <p:clrMapOvr>
+    <a:masterClrMapping/>
+  </p:clrMapOvr>
+  <p:timing>
+    <p:tnLst>
+      <p:par>
+        <p:cTn id="1" dur="indefinite" restart="never" nodeType="tmRoot"/>
+      </p:par>
+    </p:tnLst>
+  </p:timing>
+</p:sld>
+</file>
+
+<file path=ppt/slides/slide3.xml><?xml version="1.0" encoding="utf-8"?>
+<p:sld xmlns:a="http://schemas.openxmlformats.org/drawingml/2006/main" xmlns:r="http://schemas.openxmlformats.org/officeDocument/2006/relationships" xmlns:p="http://schemas.openxmlformats.org/presentationml/2006/main">
+  <p:cSld>
+    <p:spTree>
+      <p:nvGrpSpPr>
+        <p:cNvPr id="1" name=""/>
+        <p:cNvGrpSpPr/>
+        <p:nvPr/>
+      </p:nvGrpSpPr>
+      <p:grpSpPr>
+        <a:xfrm>
+          <a:off x="0" y="0"/>
+          <a:ext cx="0" cy="0"/>
+          <a:chOff x="0" y="0"/>
+          <a:chExt cx="0" cy="0"/>
+        </a:xfrm>
+      </p:grpSpPr>
+      <p:sp>
+        <p:nvSpPr>
+          <p:cNvPr id="2" name="Title 1"/>
+          <p:cNvSpPr>
+            <a:spLocks noGrp="1"/>
+          </p:cNvSpPr>
+          <p:nvPr>
+            <p:ph type="title"/>
+          </p:nvPr>
+        </p:nvSpPr>
+        <p:spPr/>
+        <p:txBody>
+          <a:bodyPr/>
+          <a:lstStyle/>
+          <a:p>
+            <a:r>
+              <a:rPr lang="bg-BG" b="1" dirty="0" smtClean="0">
+                <a:effectLst>
+                  <a:outerShdw blurRad="38100" dist="38100" dir="2700000" algn="tl">
+                    <a:srgbClr val="000000">
+                      <a:alpha val="43137"/>
+                    </a:srgbClr>
+                  </a:outerShdw>
+                </a:effectLst>
+              </a:rPr>
+              <a:t>Б-сплайн криви</a:t>
+            </a:r>
+            <a:endParaRPr lang="bg-BG" b="1" dirty="0">
+              <a:effectLst>
+                <a:outerShdw blurRad="38100" dist="38100" dir="2700000" algn="tl">
+                  <a:srgbClr val="000000">
+                    <a:alpha val="43137"/>
+                  </a:srgbClr>
+                </a:outerShdw>
+              </a:effectLst>
+            </a:endParaRPr>
+          </a:p>
+        </p:txBody>
+      </p:sp>
+      <p:sp>
+        <p:nvSpPr>
+          <p:cNvPr id="3" name="Content Placeholder 2"/>
+          <p:cNvSpPr>
+            <a:spLocks noGrp="1"/>
+          </p:cNvSpPr>
+          <p:nvPr>
+            <p:ph idx="1"/>
+          </p:nvPr>
+        </p:nvSpPr>
+        <p:spPr>
+          <a:xfrm>
+            <a:off x="677334" y="1703540"/>
+            <a:ext cx="9205702" cy="5154459"/>
+          </a:xfrm>
+        </p:spPr>
+        <p:txBody>
+          <a:bodyPr>
+            <a:normAutofit/>
+          </a:bodyPr>
+          <a:lstStyle/>
+          <a:p>
+            <a:r>
+              <a:rPr lang="ru-RU" dirty="0" smtClean="0"/>
+              <a:t>Сплайн крива е крива от степен </a:t>
+            </a:r>
+            <a:r>
+              <a:rPr lang="en-US" dirty="0" smtClean="0"/>
+              <a:t> </a:t>
+            </a:r>
+            <a:r>
+              <a:rPr lang="bg-BG" dirty="0" smtClean="0"/>
+              <a:t> </a:t>
+            </a:r>
+            <a:r>
+              <a:rPr lang="en-US" dirty="0" smtClean="0"/>
+              <a:t>, </a:t>
+            </a:r>
+            <a:r>
+              <a:rPr lang="bg-BG" dirty="0" smtClean="0"/>
+              <a:t>дефинирана чрез </a:t>
+            </a:r>
+            <a:r>
+              <a:rPr lang="bg-BG" dirty="0" smtClean="0"/>
+              <a:t>полиноми от степен </a:t>
+            </a:r>
+            <a:r>
+              <a:rPr lang="en-US" dirty="0" smtClean="0"/>
+              <a:t>   </a:t>
+            </a:r>
+            <a:r>
+              <a:rPr lang="bg-BG" dirty="0" smtClean="0"/>
+              <a:t>в дадени </a:t>
+            </a:r>
+            <a:r>
+              <a:rPr lang="bg-BG" dirty="0" smtClean="0"/>
+              <a:t>интервали</a:t>
+            </a:r>
+            <a:endParaRPr lang="bg-BG" dirty="0"/>
+          </a:p>
+          <a:p>
+            <a:endParaRPr lang="bg-BG" dirty="0" smtClean="0"/>
+          </a:p>
+          <a:p>
+            <a:r>
+              <a:rPr lang="ru-RU" dirty="0" smtClean="0"/>
+              <a:t>Пример:</a:t>
+            </a:r>
+          </a:p>
+          <a:p>
+            <a:endParaRPr lang="ru-RU" dirty="0" smtClean="0"/>
+          </a:p>
+          <a:p>
+            <a:r>
+              <a:rPr lang="ru-RU" dirty="0" smtClean="0"/>
+              <a:t>Б-сплайн идва от </a:t>
+            </a:r>
+            <a:r>
+              <a:rPr lang="en-US" dirty="0"/>
+              <a:t>b</a:t>
+            </a:r>
+            <a:r>
+              <a:rPr lang="en-US" dirty="0" smtClean="0"/>
+              <a:t>asis spline, </a:t>
+            </a:r>
+            <a:r>
+              <a:rPr lang="bg-BG" dirty="0" smtClean="0"/>
+              <a:t>като всяка сплайн крива от дадена степен може да бъде изразена чрез линейна комбинация от Б-сплайн криви от същата степен</a:t>
+            </a:r>
+            <a:endParaRPr lang="ru-RU" dirty="0"/>
+          </a:p>
+        </p:txBody>
+      </p:sp>
+      <p:graphicFrame>
+        <p:nvGraphicFramePr>
+          <p:cNvPr id="4" name="Object 3"/>
+          <p:cNvGraphicFramePr>
+            <a:graphicFrameLocks noChangeAspect="1"/>
+          </p:cNvGraphicFramePr>
+          <p:nvPr>
+            <p:extLst>
+              <p:ext uri="{D42A27DB-BD31-4B8C-83A1-F6EECF244321}">
+                <p14:modId xmlns:p14="http://schemas.microsoft.com/office/powerpoint/2010/main" val="3264056197"/>
+              </p:ext>
+            </p:extLst>
+          </p:nvPr>
+        </p:nvGraphicFramePr>
+        <p:xfrm>
+          <a:off x="2154680" y="2610736"/>
+          <a:ext cx="2820988" cy="706437"/>
+        </p:xfrm>
+        <a:graphic>
+          <a:graphicData uri="http://schemas.openxmlformats.org/presentationml/2006/ole">
+            <mc:AlternateContent xmlns:mc="http://schemas.openxmlformats.org/markup-compatibility/2006">
+              <mc:Choice xmlns:v="urn:schemas-microsoft-com:vml" Requires="v">
+                <p:oleObj spid="_x0000_s1029" name="Equation" r:id="rId4" imgW="1930320" imgH="482400" progId="Equation.DSMT4">
+                  <p:embed/>
+                </p:oleObj>
+              </mc:Choice>
+              <mc:Fallback>
+                <p:oleObj name="Equation" r:id="rId4" imgW="1930320" imgH="482400" progId="Equation.DSMT4">
+                  <p:embed/>
+                  <p:pic>
+                    <p:nvPicPr>
+                      <p:cNvPr id="0" name=""/>
+                      <p:cNvPicPr/>
+                      <p:nvPr/>
+                    </p:nvPicPr>
+                    <p:blipFill>
+                      <a:blip r:embed="rId5"/>
+                      <a:stretch>
+                        <a:fillRect/>
+                      </a:stretch>
+                    </p:blipFill>
+                    <p:spPr>
+                      <a:xfrm>
+                        <a:off x="2154680" y="2610736"/>
+                        <a:ext cx="2820988" cy="706437"/>
+                      </a:xfrm>
+                      <a:prstGeom prst="rect">
+                        <a:avLst/>
+                      </a:prstGeom>
+                    </p:spPr>
+                  </p:pic>
+                </p:oleObj>
+              </mc:Fallback>
+            </mc:AlternateContent>
+          </a:graphicData>
+        </a:graphic>
+      </p:graphicFrame>
+      <p:graphicFrame>
+        <p:nvGraphicFramePr>
+          <p:cNvPr id="5" name="Object 4"/>
+          <p:cNvGraphicFramePr>
+            <a:graphicFrameLocks noChangeAspect="1"/>
+          </p:cNvGraphicFramePr>
+          <p:nvPr>
+            <p:extLst/>
+          </p:nvPr>
+        </p:nvGraphicFramePr>
+        <p:xfrm>
+          <a:off x="4539871" y="1810386"/>
+          <a:ext cx="213339" cy="231117"/>
+        </p:xfrm>
+        <a:graphic>
+          <a:graphicData uri="http://schemas.openxmlformats.org/presentationml/2006/ole">
+            <mc:AlternateContent xmlns:mc="http://schemas.openxmlformats.org/markup-compatibility/2006">
+              <mc:Choice xmlns:v="urn:schemas-microsoft-com:vml" Requires="v">
+                <p:oleObj spid="_x0000_s1030" name="Equation" r:id="rId6" imgW="152280" imgH="164880" progId="Equation.DSMT4">
+                  <p:embed/>
+                </p:oleObj>
+              </mc:Choice>
+              <mc:Fallback>
+                <p:oleObj name="Equation" r:id="rId6" imgW="152280" imgH="164880" progId="Equation.DSMT4">
+                  <p:embed/>
+                  <p:pic>
+                    <p:nvPicPr>
+                      <p:cNvPr id="0" name=""/>
+                      <p:cNvPicPr/>
+                      <p:nvPr/>
+                    </p:nvPicPr>
+                    <p:blipFill>
+                      <a:blip r:embed="rId7"/>
+                      <a:stretch>
+                        <a:fillRect/>
+                      </a:stretch>
+                    </p:blipFill>
+                    <p:spPr>
+                      <a:xfrm>
+                        <a:off x="4539871" y="1810386"/>
+                        <a:ext cx="213339" cy="231117"/>
+                      </a:xfrm>
+                      <a:prstGeom prst="rect">
+                        <a:avLst/>
+                      </a:prstGeom>
+                    </p:spPr>
+                  </p:pic>
+                </p:oleObj>
+              </mc:Fallback>
+            </mc:AlternateContent>
+          </a:graphicData>
+        </a:graphic>
+      </p:graphicFrame>
+      <p:graphicFrame>
+        <p:nvGraphicFramePr>
+          <p:cNvPr id="7" name="Object 6"/>
+          <p:cNvGraphicFramePr>
+            <a:graphicFrameLocks noChangeAspect="1"/>
+          </p:cNvGraphicFramePr>
+          <p:nvPr>
+            <p:extLst>
+              <p:ext uri="{D42A27DB-BD31-4B8C-83A1-F6EECF244321}">
+                <p14:modId xmlns:p14="http://schemas.microsoft.com/office/powerpoint/2010/main" val="2580190835"/>
+              </p:ext>
+            </p:extLst>
+          </p:nvPr>
+        </p:nvGraphicFramePr>
+        <p:xfrm>
+          <a:off x="8931709" y="1810385"/>
+          <a:ext cx="213339" cy="231117"/>
+        </p:xfrm>
+        <a:graphic>
+          <a:graphicData uri="http://schemas.openxmlformats.org/presentationml/2006/ole">
+            <mc:AlternateContent xmlns:mc="http://schemas.openxmlformats.org/markup-compatibility/2006">
+              <mc:Choice xmlns:v="urn:schemas-microsoft-com:vml" Requires="v">
+                <p:oleObj spid="_x0000_s1031" name="Equation" r:id="rId8" imgW="152280" imgH="164880" progId="Equation.DSMT4">
+                  <p:embed/>
+                </p:oleObj>
+              </mc:Choice>
+              <mc:Fallback>
+                <p:oleObj name="Equation" r:id="rId8" imgW="152280" imgH="164880" progId="Equation.DSMT4">
+                  <p:embed/>
+                  <p:pic>
+                    <p:nvPicPr>
+                      <p:cNvPr id="0" name=""/>
+                      <p:cNvPicPr/>
+                      <p:nvPr/>
+                    </p:nvPicPr>
+                    <p:blipFill>
+                      <a:blip r:embed="rId9"/>
+                      <a:stretch>
+                        <a:fillRect/>
+                      </a:stretch>
+                    </p:blipFill>
+                    <p:spPr>
+                      <a:xfrm>
+                        <a:off x="8931709" y="1810385"/>
+                        <a:ext cx="213339" cy="231117"/>
+                      </a:xfrm>
+                      <a:prstGeom prst="rect">
+                        <a:avLst/>
+                      </a:prstGeom>
+                    </p:spPr>
+                  </p:pic>
+                </p:oleObj>
+              </mc:Fallback>
+            </mc:AlternateContent>
+          </a:graphicData>
+        </a:graphic>
+      </p:graphicFrame>
+    </p:spTree>
+    <p:extLst>
+      <p:ext uri="{BB962C8B-B14F-4D97-AF65-F5344CB8AC3E}">
+        <p14:creationId xmlns:p14="http://schemas.microsoft.com/office/powerpoint/2010/main" val="2000555314"/>
+      </p:ext>
+    </p:extLst>
+  </p:cSld>
+  <p:clrMapOvr>
+    <a:masterClrMapping/>
+  </p:clrMapOvr>
+  <p:timing>
+    <p:tnLst>
+      <p:par>
+        <p:cTn id="1" dur="indefinite" restart="never" nodeType="tmRoot"/>
+      </p:par>
+    </p:tnLst>
+  </p:timing>
+</p:sld>
+</file>
+
+<file path=ppt/slides/slide4.xml><?xml version="1.0" encoding="utf-8"?>
 <p:sld xmlns:a="http://schemas.openxmlformats.org/drawingml/2006/main" xmlns:r="http://schemas.openxmlformats.org/officeDocument/2006/relationships" xmlns:p="http://schemas.openxmlformats.org/presentationml/2006/main">
   <p:cSld>
     <p:spTree>
@@ -7471,7 +8554,7 @@
 </p:sld>
 </file>
 
-<file path=ppt/slides/slide3.xml><?xml version="1.0" encoding="utf-8"?>
+<file path=ppt/slides/slide5.xml><?xml version="1.0" encoding="utf-8"?>
 <p:sld xmlns:a="http://schemas.openxmlformats.org/drawingml/2006/main" xmlns:r="http://schemas.openxmlformats.org/officeDocument/2006/relationships" xmlns:p="http://schemas.openxmlformats.org/presentationml/2006/main">
   <p:cSld>
     <p:spTree>
@@ -7637,7 +8720,7 @@
 </p:sld>
 </file>
 
-<file path=ppt/slides/slide4.xml><?xml version="1.0" encoding="utf-8"?>
+<file path=ppt/slides/slide6.xml><?xml version="1.0" encoding="utf-8"?>
 <p:sld xmlns:a="http://schemas.openxmlformats.org/drawingml/2006/main" xmlns:r="http://schemas.openxmlformats.org/officeDocument/2006/relationships" xmlns:p="http://schemas.openxmlformats.org/presentationml/2006/main">
   <p:cSld>
     <p:spTree>
@@ -7773,7 +8856,7 @@
 </p:sld>
 </file>
 
-<file path=ppt/slides/slide5.xml><?xml version="1.0" encoding="utf-8"?>
+<file path=ppt/slides/slide7.xml><?xml version="1.0" encoding="utf-8"?>
 <p:sld xmlns:a="http://schemas.openxmlformats.org/drawingml/2006/main" xmlns:r="http://schemas.openxmlformats.org/officeDocument/2006/relationships" xmlns:p="http://schemas.openxmlformats.org/presentationml/2006/main">
   <p:cSld>
     <p:spTree>
@@ -7935,224 +9018,6 @@
 </p:sld>
 </file>
 
-<file path=ppt/slides/slide6.xml><?xml version="1.0" encoding="utf-8"?>
-<p:sld xmlns:a="http://schemas.openxmlformats.org/drawingml/2006/main" xmlns:r="http://schemas.openxmlformats.org/officeDocument/2006/relationships" xmlns:p="http://schemas.openxmlformats.org/presentationml/2006/main">
-  <p:cSld>
-    <p:spTree>
-      <p:nvGrpSpPr>
-        <p:cNvPr id="1" name=""/>
-        <p:cNvGrpSpPr/>
-        <p:nvPr/>
-      </p:nvGrpSpPr>
-      <p:grpSpPr>
-        <a:xfrm>
-          <a:off x="0" y="0"/>
-          <a:ext cx="0" cy="0"/>
-          <a:chOff x="0" y="0"/>
-          <a:chExt cx="0" cy="0"/>
-        </a:xfrm>
-      </p:grpSpPr>
-      <p:sp>
-        <p:nvSpPr>
-          <p:cNvPr id="2" name="Title 1"/>
-          <p:cNvSpPr>
-            <a:spLocks noGrp="1"/>
-          </p:cNvSpPr>
-          <p:nvPr>
-            <p:ph type="title"/>
-          </p:nvPr>
-        </p:nvSpPr>
-        <p:spPr/>
-        <p:txBody>
-          <a:bodyPr/>
-          <a:lstStyle/>
-          <a:p>
-            <a:r>
-              <a:rPr lang="bg-BG" dirty="0" smtClean="0"/>
-              <a:t>Слоеве</a:t>
-            </a:r>
-            <a:endParaRPr lang="bg-BG" dirty="0"/>
-          </a:p>
-        </p:txBody>
-      </p:sp>
-      <p:sp>
-        <p:nvSpPr>
-          <p:cNvPr id="3" name="Content Placeholder 2"/>
-          <p:cNvSpPr>
-            <a:spLocks noGrp="1"/>
-          </p:cNvSpPr>
-          <p:nvPr>
-            <p:ph idx="1"/>
-          </p:nvPr>
-        </p:nvSpPr>
-        <p:spPr/>
-        <p:txBody>
-          <a:bodyPr/>
-          <a:lstStyle/>
-          <a:p>
-            <a:r>
-              <a:rPr lang="bg-BG" dirty="0" smtClean="0"/>
-              <a:t>Класът </a:t>
-            </a:r>
-            <a:r>
-              <a:rPr lang="en-US" dirty="0" smtClean="0"/>
-              <a:t>Renderer</a:t>
-            </a:r>
-            <a:r>
-              <a:rPr lang="bg-BG" dirty="0" smtClean="0"/>
-              <a:t>, който отговаря за рисуването по полето, пази няколко слоя</a:t>
-            </a:r>
-            <a:r>
-              <a:rPr lang="en-US" dirty="0" smtClean="0"/>
-              <a:t>:</a:t>
-            </a:r>
-          </a:p>
-          <a:p>
-            <a:pPr lvl="1"/>
-            <a:r>
-              <a:rPr lang="en-US" dirty="0" smtClean="0"/>
-              <a:t>Field – </a:t>
-            </a:r>
-            <a:r>
-              <a:rPr lang="bg-BG" dirty="0" smtClean="0"/>
-              <a:t>съдържа слоя, който е трайно нарисуван</a:t>
-            </a:r>
-            <a:endParaRPr lang="en-US" dirty="0" smtClean="0"/>
-          </a:p>
-          <a:p>
-            <a:pPr lvl="1"/>
-            <a:r>
-              <a:rPr lang="en-US" dirty="0" smtClean="0"/>
-              <a:t>Past</a:t>
-            </a:r>
-            <a:r>
-              <a:rPr lang="bg-BG" dirty="0" smtClean="0"/>
-              <a:t> – съдържа слоя, който може да бъде изтрит</a:t>
-            </a:r>
-            <a:endParaRPr lang="en-US" dirty="0" smtClean="0"/>
-          </a:p>
-          <a:p>
-            <a:pPr lvl="1"/>
-            <a:r>
-              <a:rPr lang="en-US" dirty="0" smtClean="0"/>
-              <a:t>Current</a:t>
-            </a:r>
-            <a:r>
-              <a:rPr lang="bg-BG" dirty="0" smtClean="0"/>
-              <a:t> – съдържа последно нарисуваното</a:t>
-            </a:r>
-            <a:endParaRPr lang="en-US" dirty="0" smtClean="0"/>
-          </a:p>
-        </p:txBody>
-      </p:sp>
-    </p:spTree>
-    <p:extLst>
-      <p:ext uri="{BB962C8B-B14F-4D97-AF65-F5344CB8AC3E}">
-        <p14:creationId xmlns:p14="http://schemas.microsoft.com/office/powerpoint/2010/main" val="3250531524"/>
-      </p:ext>
-    </p:extLst>
-  </p:cSld>
-  <p:clrMapOvr>
-    <a:masterClrMapping/>
-  </p:clrMapOvr>
-  <p:timing>
-    <p:tnLst>
-      <p:par>
-        <p:cTn id="1" dur="indefinite" restart="never" nodeType="tmRoot"/>
-      </p:par>
-    </p:tnLst>
-  </p:timing>
-</p:sld>
-</file>
-
-<file path=ppt/slides/slide7.xml><?xml version="1.0" encoding="utf-8"?>
-<p:sld xmlns:a="http://schemas.openxmlformats.org/drawingml/2006/main" xmlns:r="http://schemas.openxmlformats.org/officeDocument/2006/relationships" xmlns:p="http://schemas.openxmlformats.org/presentationml/2006/main">
-  <p:cSld>
-    <p:spTree>
-      <p:nvGrpSpPr>
-        <p:cNvPr id="1" name=""/>
-        <p:cNvGrpSpPr/>
-        <p:nvPr/>
-      </p:nvGrpSpPr>
-      <p:grpSpPr>
-        <a:xfrm>
-          <a:off x="0" y="0"/>
-          <a:ext cx="0" cy="0"/>
-          <a:chOff x="0" y="0"/>
-          <a:chExt cx="0" cy="0"/>
-        </a:xfrm>
-      </p:grpSpPr>
-      <p:sp>
-        <p:nvSpPr>
-          <p:cNvPr id="2" name="Title 1"/>
-          <p:cNvSpPr>
-            <a:spLocks noGrp="1"/>
-          </p:cNvSpPr>
-          <p:nvPr>
-            <p:ph type="title"/>
-          </p:nvPr>
-        </p:nvSpPr>
-        <p:spPr/>
-        <p:txBody>
-          <a:bodyPr/>
-          <a:lstStyle/>
-          <a:p>
-            <a:r>
-              <a:rPr lang="bg-BG" dirty="0"/>
-              <a:t>Слоеве</a:t>
-            </a:r>
-          </a:p>
-        </p:txBody>
-      </p:sp>
-      <p:pic>
-        <p:nvPicPr>
-          <p:cNvPr id="7" name="Content Placeholder 6"/>
-          <p:cNvPicPr>
-            <a:picLocks noGrp="1" noChangeAspect="1"/>
-          </p:cNvPicPr>
-          <p:nvPr>
-            <p:ph idx="1"/>
-          </p:nvPr>
-        </p:nvPicPr>
-        <p:blipFill>
-          <a:blip r:embed="rId2">
-            <a:extLst>
-              <a:ext uri="{28A0092B-C50C-407E-A947-70E740481C1C}">
-                <a14:useLocalDpi xmlns:a14="http://schemas.microsoft.com/office/drawing/2010/main" val="0"/>
-              </a:ext>
-            </a:extLst>
-          </a:blip>
-          <a:stretch>
-            <a:fillRect/>
-          </a:stretch>
-        </p:blipFill>
-        <p:spPr>
-          <a:xfrm>
-            <a:off x="677863" y="2770209"/>
-            <a:ext cx="8596312" cy="2662194"/>
-          </a:xfrm>
-        </p:spPr>
-      </p:pic>
-    </p:spTree>
-    <p:extLst>
-      <p:ext uri="{BB962C8B-B14F-4D97-AF65-F5344CB8AC3E}">
-        <p14:creationId xmlns:p14="http://schemas.microsoft.com/office/powerpoint/2010/main" val="3837471623"/>
-      </p:ext>
-    </p:extLst>
-  </p:cSld>
-  <p:clrMapOvr>
-    <a:masterClrMapping/>
-  </p:clrMapOvr>
-  <p:timing>
-    <p:tnLst>
-      <p:par>
-        <p:cTn id="1" dur="indefinite" restart="never" nodeType="tmRoot"/>
-      </p:par>
-    </p:tnLst>
-  </p:timing>
-</p:sld>
-</file>
-
 <file path=ppt/slides/slide8.xml><?xml version="1.0" encoding="utf-8"?>
 <p:sld xmlns:a="http://schemas.openxmlformats.org/drawingml/2006/main" xmlns:r="http://schemas.openxmlformats.org/officeDocument/2006/relationships" xmlns:p="http://schemas.openxmlformats.org/presentationml/2006/main">
   <p:cSld>
@@ -8186,45 +9051,87 @@
           <a:lstStyle/>
           <a:p>
             <a:r>
-              <a:rPr lang="bg-BG" dirty="0"/>
+              <a:rPr lang="bg-BG" dirty="0" smtClean="0"/>
               <a:t>Слоеве</a:t>
             </a:r>
-          </a:p>
-        </p:txBody>
-      </p:sp>
-      <p:pic>
-        <p:nvPicPr>
-          <p:cNvPr id="6" name="Content Placeholder 5"/>
-          <p:cNvPicPr>
-            <a:picLocks noGrp="1" noChangeAspect="1"/>
-          </p:cNvPicPr>
+            <a:endParaRPr lang="bg-BG" dirty="0"/>
+          </a:p>
+        </p:txBody>
+      </p:sp>
+      <p:sp>
+        <p:nvSpPr>
+          <p:cNvPr id="3" name="Content Placeholder 2"/>
+          <p:cNvSpPr>
+            <a:spLocks noGrp="1"/>
+          </p:cNvSpPr>
           <p:nvPr>
             <p:ph idx="1"/>
           </p:nvPr>
-        </p:nvPicPr>
-        <p:blipFill>
-          <a:blip r:embed="rId2">
-            <a:extLst>
-              <a:ext uri="{28A0092B-C50C-407E-A947-70E740481C1C}">
-                <a14:useLocalDpi xmlns:a14="http://schemas.microsoft.com/office/drawing/2010/main" val="0"/>
-              </a:ext>
-            </a:extLst>
-          </a:blip>
-          <a:stretch>
-            <a:fillRect/>
-          </a:stretch>
-        </p:blipFill>
-        <p:spPr>
-          <a:xfrm>
-            <a:off x="677863" y="2757327"/>
-            <a:ext cx="8596312" cy="2687958"/>
-          </a:xfrm>
-        </p:spPr>
-      </p:pic>
+        </p:nvSpPr>
+        <p:spPr/>
+        <p:txBody>
+          <a:bodyPr/>
+          <a:lstStyle/>
+          <a:p>
+            <a:r>
+              <a:rPr lang="bg-BG" dirty="0" smtClean="0"/>
+              <a:t>Класът </a:t>
+            </a:r>
+            <a:r>
+              <a:rPr lang="en-US" dirty="0" smtClean="0"/>
+              <a:t>Renderer</a:t>
+            </a:r>
+            <a:r>
+              <a:rPr lang="bg-BG" dirty="0" smtClean="0"/>
+              <a:t>, който отговаря за рисуването по полето, пази няколко слоя</a:t>
+            </a:r>
+            <a:r>
+              <a:rPr lang="en-US" dirty="0" smtClean="0"/>
+              <a:t>:</a:t>
+            </a:r>
+          </a:p>
+          <a:p>
+            <a:pPr lvl="1"/>
+            <a:r>
+              <a:rPr lang="en-US" dirty="0" smtClean="0"/>
+              <a:t>Field – </a:t>
+            </a:r>
+            <a:r>
+              <a:rPr lang="bg-BG" dirty="0" smtClean="0"/>
+              <a:t>съдържа слоя, който е трайно нарисуван</a:t>
+            </a:r>
+            <a:endParaRPr lang="en-US" dirty="0" smtClean="0"/>
+          </a:p>
+          <a:p>
+            <a:pPr lvl="1"/>
+            <a:r>
+              <a:rPr lang="en-US" dirty="0" smtClean="0"/>
+              <a:t>Past</a:t>
+            </a:r>
+            <a:r>
+              <a:rPr lang="bg-BG" dirty="0" smtClean="0"/>
+              <a:t> – съдържа слоя, който може да бъде изтрит</a:t>
+            </a:r>
+            <a:endParaRPr lang="en-US" dirty="0" smtClean="0"/>
+          </a:p>
+          <a:p>
+            <a:pPr lvl="1"/>
+            <a:r>
+              <a:rPr lang="en-US" dirty="0" smtClean="0"/>
+              <a:t>Current</a:t>
+            </a:r>
+            <a:r>
+              <a:rPr lang="bg-BG" dirty="0" smtClean="0"/>
+              <a:t> – съдържа последно нарисуваното</a:t>
+            </a:r>
+            <a:endParaRPr lang="en-US" dirty="0" smtClean="0"/>
+          </a:p>
+        </p:txBody>
+      </p:sp>
     </p:spTree>
     <p:extLst>
       <p:ext uri="{BB962C8B-B14F-4D97-AF65-F5344CB8AC3E}">
-        <p14:creationId xmlns:p14="http://schemas.microsoft.com/office/powerpoint/2010/main" val="1769117117"/>
+        <p14:creationId xmlns:p14="http://schemas.microsoft.com/office/powerpoint/2010/main" val="3250531524"/>
       </p:ext>
     </p:extLst>
   </p:cSld>
@@ -8282,7 +9189,7 @@
       </p:sp>
       <p:pic>
         <p:nvPicPr>
-          <p:cNvPr id="6" name="Content Placeholder 5"/>
+          <p:cNvPr id="7" name="Content Placeholder 6"/>
           <p:cNvPicPr>
             <a:picLocks noGrp="1" noChangeAspect="1"/>
           </p:cNvPicPr>
@@ -8304,15 +9211,15 @@
         </p:blipFill>
         <p:spPr>
           <a:xfrm>
-            <a:off x="677863" y="2487910"/>
-            <a:ext cx="8596312" cy="3226792"/>
+            <a:off x="677863" y="2770209"/>
+            <a:ext cx="8596312" cy="2662194"/>
           </a:xfrm>
         </p:spPr>
       </p:pic>
     </p:spTree>
     <p:extLst>
       <p:ext uri="{BB962C8B-B14F-4D97-AF65-F5344CB8AC3E}">
-        <p14:creationId xmlns:p14="http://schemas.microsoft.com/office/powerpoint/2010/main" val="4092524987"/>
+        <p14:creationId xmlns:p14="http://schemas.microsoft.com/office/powerpoint/2010/main" val="3837471623"/>
       </p:ext>
     </p:extLst>
   </p:cSld>
@@ -8584,4 +9491,265 @@
     </a:ext>
   </a:extLst>
 </a:theme>
+</file>
+
+<file path=ppt/theme/theme2.xml><?xml version="1.0" encoding="utf-8"?>
+<a:theme xmlns:a="http://schemas.openxmlformats.org/drawingml/2006/main" name="Office Theme">
+  <a:themeElements>
+    <a:clrScheme name="Office">
+      <a:dk1>
+        <a:sysClr val="windowText" lastClr="000000"/>
+      </a:dk1>
+      <a:lt1>
+        <a:sysClr val="window" lastClr="FFFFFF"/>
+      </a:lt1>
+      <a:dk2>
+        <a:srgbClr val="44546A"/>
+      </a:dk2>
+      <a:lt2>
+        <a:srgbClr val="E7E6E6"/>
+      </a:lt2>
+      <a:accent1>
+        <a:srgbClr val="5B9BD5"/>
+      </a:accent1>
+      <a:accent2>
+        <a:srgbClr val="ED7D31"/>
+      </a:accent2>
+      <a:accent3>
+        <a:srgbClr val="A5A5A5"/>
+      </a:accent3>
+      <a:accent4>
+        <a:srgbClr val="FFC000"/>
+      </a:accent4>
+      <a:accent5>
+        <a:srgbClr val="4472C4"/>
+      </a:accent5>
+      <a:accent6>
+        <a:srgbClr val="70AD47"/>
+      </a:accent6>
+      <a:hlink>
+        <a:srgbClr val="0563C1"/>
+      </a:hlink>
+      <a:folHlink>
+        <a:srgbClr val="954F72"/>
+      </a:folHlink>
+    </a:clrScheme>
+    <a:fontScheme name="Office">
+      <a:majorFont>
+        <a:latin typeface="Calibri Light" panose="020F0302020204030204"/>
+        <a:ea typeface=""/>
+        <a:cs typeface=""/>
+        <a:font script="Jpan" typeface="ＭＳ Ｐゴシック"/>
+        <a:font script="Hang" typeface="맑은 고딕"/>
+        <a:font script="Hans" typeface="宋体"/>
+        <a:font script="Hant" typeface="新細明體"/>
+        <a:font script="Arab" typeface="Times New Roman"/>
+        <a:font script="Hebr" typeface="Times New Roman"/>
+        <a:font script="Thai" typeface="Angsana New"/>
+        <a:font script="Ethi" typeface="Nyala"/>
+        <a:font script="Beng" typeface="Vrinda"/>
+        <a:font script="Gujr" typeface="Shruti"/>
+        <a:font script="Khmr" typeface="MoolBoran"/>
+        <a:font script="Knda" typeface="Tunga"/>
+        <a:font script="Guru" typeface="Raavi"/>
+        <a:font script="Cans" typeface="Euphemia"/>
+        <a:font script="Cher" typeface="Plantagenet Cherokee"/>
+        <a:font script="Yiii" typeface="Microsoft Yi Baiti"/>
+        <a:font script="Tibt" typeface="Microsoft Himalaya"/>
+        <a:font script="Thaa" typeface="MV Boli"/>
+        <a:font script="Deva" typeface="Mangal"/>
+        <a:font script="Telu" typeface="Gautami"/>
+        <a:font script="Taml" typeface="Latha"/>
+        <a:font script="Syrc" typeface="Estrangelo Edessa"/>
+        <a:font script="Orya" typeface="Kalinga"/>
+        <a:font script="Mlym" typeface="Kartika"/>
+        <a:font script="Laoo" typeface="DokChampa"/>
+        <a:font script="Sinh" typeface="Iskoola Pota"/>
+        <a:font script="Mong" typeface="Mongolian Baiti"/>
+        <a:font script="Viet" typeface="Times New Roman"/>
+        <a:font script="Uigh" typeface="Microsoft Uighur"/>
+        <a:font script="Geor" typeface="Sylfaen"/>
+      </a:majorFont>
+      <a:minorFont>
+        <a:latin typeface="Calibri" panose="020F0502020204030204"/>
+        <a:ea typeface=""/>
+        <a:cs typeface=""/>
+        <a:font script="Jpan" typeface="ＭＳ Ｐゴシック"/>
+        <a:font script="Hang" typeface="맑은 고딕"/>
+        <a:font script="Hans" typeface="宋体"/>
+        <a:font script="Hant" typeface="新細明體"/>
+        <a:font script="Arab" typeface="Arial"/>
+        <a:font script="Hebr" typeface="Arial"/>
+        <a:font script="Thai" typeface="Cordia New"/>
+        <a:font script="Ethi" typeface="Nyala"/>
+        <a:font script="Beng" typeface="Vrinda"/>
+        <a:font script="Gujr" typeface="Shruti"/>
+        <a:font script="Khmr" typeface="DaunPenh"/>
+        <a:font script="Knda" typeface="Tunga"/>
+        <a:font script="Guru" typeface="Raavi"/>
+        <a:font script="Cans" typeface="Euphemia"/>
+        <a:font script="Cher" typeface="Plantagenet Cherokee"/>
+        <a:font script="Yiii" typeface="Microsoft Yi Baiti"/>
+        <a:font script="Tibt" typeface="Microsoft Himalaya"/>
+        <a:font script="Thaa" typeface="MV Boli"/>
+        <a:font script="Deva" typeface="Mangal"/>
+        <a:font script="Telu" typeface="Gautami"/>
+        <a:font script="Taml" typeface="Latha"/>
+        <a:font script="Syrc" typeface="Estrangelo Edessa"/>
+        <a:font script="Orya" typeface="Kalinga"/>
+        <a:font script="Mlym" typeface="Kartika"/>
+        <a:font script="Laoo" typeface="DokChampa"/>
+        <a:font script="Sinh" typeface="Iskoola Pota"/>
+        <a:font script="Mong" typeface="Mongolian Baiti"/>
+        <a:font script="Viet" typeface="Arial"/>
+        <a:font script="Uigh" typeface="Microsoft Uighur"/>
+        <a:font script="Geor" typeface="Sylfaen"/>
+      </a:minorFont>
+    </a:fontScheme>
+    <a:fmtScheme name="Office">
+      <a:fillStyleLst>
+        <a:solidFill>
+          <a:schemeClr val="phClr"/>
+        </a:solidFill>
+        <a:gradFill rotWithShape="1">
+          <a:gsLst>
+            <a:gs pos="0">
+              <a:schemeClr val="phClr">
+                <a:lumMod val="110000"/>
+                <a:satMod val="105000"/>
+                <a:tint val="67000"/>
+              </a:schemeClr>
+            </a:gs>
+            <a:gs pos="50000">
+              <a:schemeClr val="phClr">
+                <a:lumMod val="105000"/>
+                <a:satMod val="103000"/>
+                <a:tint val="73000"/>
+              </a:schemeClr>
+            </a:gs>
+            <a:gs pos="100000">
+              <a:schemeClr val="phClr">
+                <a:lumMod val="105000"/>
+                <a:satMod val="109000"/>
+                <a:tint val="81000"/>
+              </a:schemeClr>
+            </a:gs>
+          </a:gsLst>
+          <a:lin ang="5400000" scaled="0"/>
+        </a:gradFill>
+        <a:gradFill rotWithShape="1">
+          <a:gsLst>
+            <a:gs pos="0">
+              <a:schemeClr val="phClr">
+                <a:satMod val="103000"/>
+                <a:lumMod val="102000"/>
+                <a:tint val="94000"/>
+              </a:schemeClr>
+            </a:gs>
+            <a:gs pos="50000">
+              <a:schemeClr val="phClr">
+                <a:satMod val="110000"/>
+                <a:lumMod val="100000"/>
+                <a:shade val="100000"/>
+              </a:schemeClr>
+            </a:gs>
+            <a:gs pos="100000">
+              <a:schemeClr val="phClr">
+                <a:lumMod val="99000"/>
+                <a:satMod val="120000"/>
+                <a:shade val="78000"/>
+              </a:schemeClr>
+            </a:gs>
+          </a:gsLst>
+          <a:lin ang="5400000" scaled="0"/>
+        </a:gradFill>
+      </a:fillStyleLst>
+      <a:lnStyleLst>
+        <a:ln w="6350" cap="flat" cmpd="sng" algn="ctr">
+          <a:solidFill>
+            <a:schemeClr val="phClr"/>
+          </a:solidFill>
+          <a:prstDash val="solid"/>
+          <a:miter lim="800000"/>
+        </a:ln>
+        <a:ln w="12700" cap="flat" cmpd="sng" algn="ctr">
+          <a:solidFill>
+            <a:schemeClr val="phClr"/>
+          </a:solidFill>
+          <a:prstDash val="solid"/>
+          <a:miter lim="800000"/>
+        </a:ln>
+        <a:ln w="19050" cap="flat" cmpd="sng" algn="ctr">
+          <a:solidFill>
+            <a:schemeClr val="phClr"/>
+          </a:solidFill>
+          <a:prstDash val="solid"/>
+          <a:miter lim="800000"/>
+        </a:ln>
+      </a:lnStyleLst>
+      <a:effectStyleLst>
+        <a:effectStyle>
+          <a:effectLst/>
+        </a:effectStyle>
+        <a:effectStyle>
+          <a:effectLst/>
+        </a:effectStyle>
+        <a:effectStyle>
+          <a:effectLst>
+            <a:outerShdw blurRad="57150" dist="19050" dir="5400000" algn="ctr" rotWithShape="0">
+              <a:srgbClr val="000000">
+                <a:alpha val="63000"/>
+              </a:srgbClr>
+            </a:outerShdw>
+          </a:effectLst>
+        </a:effectStyle>
+      </a:effectStyleLst>
+      <a:bgFillStyleLst>
+        <a:solidFill>
+          <a:schemeClr val="phClr"/>
+        </a:solidFill>
+        <a:solidFill>
+          <a:schemeClr val="phClr">
+            <a:tint val="95000"/>
+            <a:satMod val="170000"/>
+          </a:schemeClr>
+        </a:solidFill>
+        <a:gradFill rotWithShape="1">
+          <a:gsLst>
+            <a:gs pos="0">
+              <a:schemeClr val="phClr">
+                <a:tint val="93000"/>
+                <a:satMod val="150000"/>
+                <a:shade val="98000"/>
+                <a:lumMod val="102000"/>
+              </a:schemeClr>
+            </a:gs>
+            <a:gs pos="50000">
+              <a:schemeClr val="phClr">
+                <a:tint val="98000"/>
+                <a:satMod val="130000"/>
+                <a:shade val="90000"/>
+                <a:lumMod val="103000"/>
+              </a:schemeClr>
+            </a:gs>
+            <a:gs pos="100000">
+              <a:schemeClr val="phClr">
+                <a:shade val="63000"/>
+                <a:satMod val="120000"/>
+              </a:schemeClr>
+            </a:gs>
+          </a:gsLst>
+          <a:lin ang="5400000" scaled="0"/>
+        </a:gradFill>
+      </a:bgFillStyleLst>
+    </a:fmtScheme>
+  </a:themeElements>
+  <a:objectDefaults/>
+  <a:extraClrSchemeLst/>
+  <a:extLst>
+    <a:ext uri="{05A4C25C-085E-4340-85A3-A5531E510DB2}">
+      <thm15:themeFamily xmlns:thm15="http://schemas.microsoft.com/office/thememl/2012/main" name="Office Theme" id="{62F939B6-93AF-4DB8-9C6B-D6C7DFDC589F}" vid="{4A3C46E8-61CC-4603-A589-7422A47A8E4A}"/>
+    </a:ext>
+  </a:extLst>
+</a:theme>
 </file>
</xml_diff>

<commit_message>
+ added slide for Bresenham algorithm
</commit_message>
<xml_diff>
--- a/presentation/PresentationFinal.pptx
+++ b/presentation/PresentationFinal.pptx
@@ -5,7 +5,7 @@
     <p:sldMasterId id="2147483711" r:id="rId1"/>
   </p:sldMasterIdLst>
   <p:notesMasterIdLst>
-    <p:notesMasterId r:id="rId24"/>
+    <p:notesMasterId r:id="rId25"/>
   </p:notesMasterIdLst>
   <p:sldIdLst>
     <p:sldId id="256" r:id="rId2"/>
@@ -13,23 +13,24 @@
     <p:sldId id="259" r:id="rId4"/>
     <p:sldId id="260" r:id="rId5"/>
     <p:sldId id="261" r:id="rId6"/>
-    <p:sldId id="263" r:id="rId7"/>
-    <p:sldId id="264" r:id="rId8"/>
-    <p:sldId id="265" r:id="rId9"/>
-    <p:sldId id="266" r:id="rId10"/>
-    <p:sldId id="267" r:id="rId11"/>
-    <p:sldId id="268" r:id="rId12"/>
-    <p:sldId id="269" r:id="rId13"/>
-    <p:sldId id="270" r:id="rId14"/>
-    <p:sldId id="271" r:id="rId15"/>
-    <p:sldId id="272" r:id="rId16"/>
-    <p:sldId id="273" r:id="rId17"/>
-    <p:sldId id="274" r:id="rId18"/>
-    <p:sldId id="275" r:id="rId19"/>
-    <p:sldId id="276" r:id="rId20"/>
-    <p:sldId id="257" r:id="rId21"/>
-    <p:sldId id="258" r:id="rId22"/>
-    <p:sldId id="278" r:id="rId23"/>
+    <p:sldId id="279" r:id="rId7"/>
+    <p:sldId id="263" r:id="rId8"/>
+    <p:sldId id="264" r:id="rId9"/>
+    <p:sldId id="265" r:id="rId10"/>
+    <p:sldId id="266" r:id="rId11"/>
+    <p:sldId id="267" r:id="rId12"/>
+    <p:sldId id="268" r:id="rId13"/>
+    <p:sldId id="269" r:id="rId14"/>
+    <p:sldId id="270" r:id="rId15"/>
+    <p:sldId id="271" r:id="rId16"/>
+    <p:sldId id="272" r:id="rId17"/>
+    <p:sldId id="273" r:id="rId18"/>
+    <p:sldId id="274" r:id="rId19"/>
+    <p:sldId id="275" r:id="rId20"/>
+    <p:sldId id="276" r:id="rId21"/>
+    <p:sldId id="257" r:id="rId22"/>
+    <p:sldId id="258" r:id="rId23"/>
+    <p:sldId id="278" r:id="rId24"/>
   </p:sldIdLst>
   <p:sldSz cx="12192000" cy="6858000"/>
   <p:notesSz cx="6858000" cy="9144000"/>
@@ -551,7 +552,7 @@
           <a:p>
             <a:fld id="{EA4A29BA-C2AF-4A37-A2C7-89F86B0D71DA}" type="slidenum">
               <a:rPr lang="bg-BG" smtClean="0"/>
-              <a:t>8</a:t>
+              <a:t>9</a:t>
             </a:fld>
             <a:endParaRPr lang="bg-BG"/>
           </a:p>
@@ -6437,15 +6438,72 @@
           <a:p>
             <a:r>
               <a:rPr lang="bg-BG" dirty="0" smtClean="0"/>
-              <a:t>Квадрат</a:t>
+              <a:t>Правоъгълник</a:t>
             </a:r>
             <a:endParaRPr lang="bg-BG" dirty="0"/>
+          </a:p>
+        </p:txBody>
+      </p:sp>
+      <p:sp>
+        <p:nvSpPr>
+          <p:cNvPr id="7" name="TextBox 6"/>
+          <p:cNvSpPr txBox="1"/>
+          <p:nvPr/>
+        </p:nvSpPr>
+        <p:spPr>
+          <a:xfrm>
+            <a:off x="1009948" y="1842766"/>
+            <a:ext cx="2403222" cy="984885"/>
+          </a:xfrm>
+          <a:prstGeom prst="rect">
+            <a:avLst/>
+          </a:prstGeom>
+          <a:noFill/>
+        </p:spPr>
+        <p:txBody>
+          <a:bodyPr wrap="none" rtlCol="0">
+            <a:spAutoFit/>
+          </a:bodyPr>
+          <a:lstStyle/>
+          <a:p>
+            <a:r>
+              <a:rPr lang="en-US" sz="2000" dirty="0"/>
+              <a:t>P1 – </a:t>
+            </a:r>
+            <a:r>
+              <a:rPr lang="bg-BG" sz="2000" dirty="0"/>
+              <a:t>начална точка</a:t>
+            </a:r>
+          </a:p>
+          <a:p>
+            <a:r>
+              <a:rPr lang="en-US" sz="2000" dirty="0"/>
+              <a:t>P2 </a:t>
+            </a:r>
+            <a:r>
+              <a:rPr lang="en-US" sz="2000" dirty="0" smtClean="0"/>
+              <a:t>–</a:t>
+            </a:r>
+            <a:r>
+              <a:rPr lang="bg-BG" sz="2000" dirty="0" smtClean="0"/>
+              <a:t> крайна </a:t>
+            </a:r>
+            <a:r>
+              <a:rPr lang="bg-BG" sz="2000" dirty="0"/>
+              <a:t>точка</a:t>
+            </a:r>
+          </a:p>
+          <a:p>
+            <a:endParaRPr lang="en-US" dirty="0">
+              <a:latin typeface="Times New Roman" panose="02020603050405020304" pitchFamily="18" charset="0"/>
+              <a:cs typeface="Times New Roman" panose="02020603050405020304" pitchFamily="18" charset="0"/>
+            </a:endParaRPr>
           </a:p>
         </p:txBody>
       </p:sp>
       <p:pic>
         <p:nvPicPr>
-          <p:cNvPr id="6" name="Content Placeholder 5"/>
+          <p:cNvPr id="4" name="Content Placeholder 3"/>
           <p:cNvPicPr>
             <a:picLocks noGrp="1" noChangeAspect="1"/>
           </p:cNvPicPr>
@@ -6467,99 +6525,15 @@
         </p:blipFill>
         <p:spPr>
           <a:xfrm>
-            <a:off x="5201878" y="1930400"/>
-            <a:ext cx="3906829" cy="3201694"/>
+            <a:off x="4435907" y="1930400"/>
+            <a:ext cx="4838095" cy="2790476"/>
           </a:xfrm>
         </p:spPr>
       </p:pic>
-      <p:sp>
-        <p:nvSpPr>
-          <p:cNvPr id="7" name="TextBox 6"/>
-          <p:cNvSpPr txBox="1"/>
-          <p:nvPr/>
-        </p:nvSpPr>
-        <p:spPr>
-          <a:xfrm>
-            <a:off x="400377" y="1930400"/>
-            <a:ext cx="5141151" cy="1908215"/>
-          </a:xfrm>
-          <a:prstGeom prst="rect">
-            <a:avLst/>
-          </a:prstGeom>
-          <a:noFill/>
-        </p:spPr>
-        <p:txBody>
-          <a:bodyPr wrap="none" rtlCol="0">
-            <a:spAutoFit/>
-          </a:bodyPr>
-          <a:lstStyle/>
-          <a:p>
-            <a:r>
-              <a:rPr lang="en-US" sz="2000" dirty="0" smtClean="0"/>
-              <a:t>P1 – </a:t>
-            </a:r>
-            <a:r>
-              <a:rPr lang="bg-BG" sz="2000" dirty="0" smtClean="0"/>
-              <a:t>начална точка</a:t>
-            </a:r>
-          </a:p>
-          <a:p>
-            <a:r>
-              <a:rPr lang="en-US" sz="2000" dirty="0" smtClean="0"/>
-              <a:t>P2 –</a:t>
-            </a:r>
-            <a:r>
-              <a:rPr lang="bg-BG" sz="2000" dirty="0" smtClean="0"/>
-              <a:t> крайна точка</a:t>
-            </a:r>
-          </a:p>
-          <a:p>
-            <a:r>
-              <a:rPr lang="en-US" sz="2000" dirty="0" smtClean="0"/>
-              <a:t>Diff e </a:t>
-            </a:r>
-            <a:r>
-              <a:rPr lang="bg-BG" sz="2000" dirty="0" smtClean="0"/>
-              <a:t>абсолютната стойност от разликата</a:t>
-            </a:r>
-          </a:p>
-          <a:p>
-            <a:r>
-              <a:rPr lang="bg-BG" sz="2000" dirty="0"/>
-              <a:t>н</a:t>
-            </a:r>
-            <a:r>
-              <a:rPr lang="bg-BG" sz="2000" dirty="0" smtClean="0"/>
-              <a:t>а крайната и началната точка,</a:t>
-            </a:r>
-          </a:p>
-          <a:p>
-            <a:r>
-              <a:rPr lang="bg-BG" sz="2000" dirty="0" smtClean="0"/>
-              <a:t>измерена по </a:t>
-            </a:r>
-            <a:r>
-              <a:rPr lang="bg-BG" sz="2000" dirty="0"/>
-              <a:t>У</a:t>
-            </a:r>
-            <a:r>
-              <a:rPr lang="en-US" sz="2000" dirty="0" smtClean="0"/>
-              <a:t> </a:t>
-            </a:r>
-            <a:r>
-              <a:rPr lang="bg-BG" sz="2000" dirty="0" smtClean="0"/>
-              <a:t>координата.</a:t>
-            </a:r>
-          </a:p>
-          <a:p>
-            <a:endParaRPr lang="bg-BG" dirty="0"/>
-          </a:p>
-        </p:txBody>
-      </p:sp>
     </p:spTree>
     <p:extLst>
       <p:ext uri="{BB962C8B-B14F-4D97-AF65-F5344CB8AC3E}">
-        <p14:creationId xmlns:p14="http://schemas.microsoft.com/office/powerpoint/2010/main" val="3555331425"/>
+        <p14:creationId xmlns:p14="http://schemas.microsoft.com/office/powerpoint/2010/main" val="3405315550"/>
       </p:ext>
     </p:extLst>
   </p:cSld>
@@ -6610,6 +6584,179 @@
           <a:p>
             <a:r>
               <a:rPr lang="bg-BG" dirty="0" smtClean="0"/>
+              <a:t>Квадрат</a:t>
+            </a:r>
+            <a:endParaRPr lang="bg-BG" dirty="0"/>
+          </a:p>
+        </p:txBody>
+      </p:sp>
+      <p:pic>
+        <p:nvPicPr>
+          <p:cNvPr id="6" name="Content Placeholder 5"/>
+          <p:cNvPicPr>
+            <a:picLocks noGrp="1" noChangeAspect="1"/>
+          </p:cNvPicPr>
+          <p:nvPr>
+            <p:ph idx="1"/>
+          </p:nvPr>
+        </p:nvPicPr>
+        <p:blipFill>
+          <a:blip r:embed="rId2">
+            <a:extLst>
+              <a:ext uri="{28A0092B-C50C-407E-A947-70E740481C1C}">
+                <a14:useLocalDpi xmlns:a14="http://schemas.microsoft.com/office/drawing/2010/main" val="0"/>
+              </a:ext>
+            </a:extLst>
+          </a:blip>
+          <a:stretch>
+            <a:fillRect/>
+          </a:stretch>
+        </p:blipFill>
+        <p:spPr>
+          <a:xfrm>
+            <a:off x="5201878" y="1930400"/>
+            <a:ext cx="3906829" cy="3201694"/>
+          </a:xfrm>
+        </p:spPr>
+      </p:pic>
+      <p:sp>
+        <p:nvSpPr>
+          <p:cNvPr id="7" name="TextBox 6"/>
+          <p:cNvSpPr txBox="1"/>
+          <p:nvPr/>
+        </p:nvSpPr>
+        <p:spPr>
+          <a:xfrm>
+            <a:off x="400377" y="1930400"/>
+            <a:ext cx="5141151" cy="1908215"/>
+          </a:xfrm>
+          <a:prstGeom prst="rect">
+            <a:avLst/>
+          </a:prstGeom>
+          <a:noFill/>
+        </p:spPr>
+        <p:txBody>
+          <a:bodyPr wrap="none" rtlCol="0">
+            <a:spAutoFit/>
+          </a:bodyPr>
+          <a:lstStyle/>
+          <a:p>
+            <a:r>
+              <a:rPr lang="en-US" sz="2000" dirty="0" smtClean="0"/>
+              <a:t>P1 – </a:t>
+            </a:r>
+            <a:r>
+              <a:rPr lang="bg-BG" sz="2000" dirty="0" smtClean="0"/>
+              <a:t>начална точка</a:t>
+            </a:r>
+          </a:p>
+          <a:p>
+            <a:r>
+              <a:rPr lang="en-US" sz="2000" dirty="0" smtClean="0"/>
+              <a:t>P2 –</a:t>
+            </a:r>
+            <a:r>
+              <a:rPr lang="bg-BG" sz="2000" dirty="0" smtClean="0"/>
+              <a:t> крайна точка</a:t>
+            </a:r>
+          </a:p>
+          <a:p>
+            <a:r>
+              <a:rPr lang="en-US" sz="2000" dirty="0" smtClean="0"/>
+              <a:t>Diff e </a:t>
+            </a:r>
+            <a:r>
+              <a:rPr lang="bg-BG" sz="2000" dirty="0" smtClean="0"/>
+              <a:t>абсолютната стойност от разликата</a:t>
+            </a:r>
+          </a:p>
+          <a:p>
+            <a:r>
+              <a:rPr lang="bg-BG" sz="2000" dirty="0"/>
+              <a:t>н</a:t>
+            </a:r>
+            <a:r>
+              <a:rPr lang="bg-BG" sz="2000" dirty="0" smtClean="0"/>
+              <a:t>а крайната и началната точка,</a:t>
+            </a:r>
+          </a:p>
+          <a:p>
+            <a:r>
+              <a:rPr lang="bg-BG" sz="2000" dirty="0" smtClean="0"/>
+              <a:t>измерена по </a:t>
+            </a:r>
+            <a:r>
+              <a:rPr lang="bg-BG" sz="2000" dirty="0"/>
+              <a:t>У</a:t>
+            </a:r>
+            <a:r>
+              <a:rPr lang="en-US" sz="2000" dirty="0" smtClean="0"/>
+              <a:t> </a:t>
+            </a:r>
+            <a:r>
+              <a:rPr lang="bg-BG" sz="2000" dirty="0" smtClean="0"/>
+              <a:t>координата.</a:t>
+            </a:r>
+          </a:p>
+          <a:p>
+            <a:endParaRPr lang="bg-BG" dirty="0"/>
+          </a:p>
+        </p:txBody>
+      </p:sp>
+    </p:spTree>
+    <p:extLst>
+      <p:ext uri="{BB962C8B-B14F-4D97-AF65-F5344CB8AC3E}">
+        <p14:creationId xmlns:p14="http://schemas.microsoft.com/office/powerpoint/2010/main" val="3555331425"/>
+      </p:ext>
+    </p:extLst>
+  </p:cSld>
+  <p:clrMapOvr>
+    <a:masterClrMapping/>
+  </p:clrMapOvr>
+  <p:timing>
+    <p:tnLst>
+      <p:par>
+        <p:cTn id="1" dur="indefinite" restart="never" nodeType="tmRoot"/>
+      </p:par>
+    </p:tnLst>
+  </p:timing>
+</p:sld>
+</file>
+
+<file path=ppt/slides/slide12.xml><?xml version="1.0" encoding="utf-8"?>
+<p:sld xmlns:a="http://schemas.openxmlformats.org/drawingml/2006/main" xmlns:r="http://schemas.openxmlformats.org/officeDocument/2006/relationships" xmlns:p="http://schemas.openxmlformats.org/presentationml/2006/main">
+  <p:cSld>
+    <p:spTree>
+      <p:nvGrpSpPr>
+        <p:cNvPr id="1" name=""/>
+        <p:cNvGrpSpPr/>
+        <p:nvPr/>
+      </p:nvGrpSpPr>
+      <p:grpSpPr>
+        <a:xfrm>
+          <a:off x="0" y="0"/>
+          <a:ext cx="0" cy="0"/>
+          <a:chOff x="0" y="0"/>
+          <a:chExt cx="0" cy="0"/>
+        </a:xfrm>
+      </p:grpSpPr>
+      <p:sp>
+        <p:nvSpPr>
+          <p:cNvPr id="2" name="Title 1"/>
+          <p:cNvSpPr>
+            <a:spLocks noGrp="1"/>
+          </p:cNvSpPr>
+          <p:nvPr>
+            <p:ph type="title"/>
+          </p:nvPr>
+        </p:nvSpPr>
+        <p:spPr/>
+        <p:txBody>
+          <a:bodyPr/>
+          <a:lstStyle/>
+          <a:p>
+            <a:r>
+              <a:rPr lang="bg-BG" dirty="0" smtClean="0"/>
               <a:t>Триъгълник</a:t>
             </a:r>
             <a:endParaRPr lang="bg-BG" dirty="0"/>
@@ -6733,7 +6880,7 @@
 </p:sld>
 </file>
 
-<file path=ppt/slides/slide12.xml><?xml version="1.0" encoding="utf-8"?>
+<file path=ppt/slides/slide13.xml><?xml version="1.0" encoding="utf-8"?>
 <p:sld xmlns:a="http://schemas.openxmlformats.org/drawingml/2006/main" xmlns:r="http://schemas.openxmlformats.org/officeDocument/2006/relationships" xmlns:p="http://schemas.openxmlformats.org/presentationml/2006/main">
   <p:cSld>
     <p:spTree>
@@ -6895,7 +7042,7 @@
 </p:sld>
 </file>
 
-<file path=ppt/slides/slide13.xml><?xml version="1.0" encoding="utf-8"?>
+<file path=ppt/slides/slide14.xml><?xml version="1.0" encoding="utf-8"?>
 <p:sld xmlns:a="http://schemas.openxmlformats.org/drawingml/2006/main" xmlns:r="http://schemas.openxmlformats.org/officeDocument/2006/relationships" xmlns:p="http://schemas.openxmlformats.org/presentationml/2006/main">
   <p:cSld>
     <p:spTree>
@@ -7027,7 +7174,7 @@
 </p:sld>
 </file>
 
-<file path=ppt/slides/slide14.xml><?xml version="1.0" encoding="utf-8"?>
+<file path=ppt/slides/slide15.xml><?xml version="1.0" encoding="utf-8"?>
 <p:sld xmlns:a="http://schemas.openxmlformats.org/drawingml/2006/main" xmlns:r="http://schemas.openxmlformats.org/officeDocument/2006/relationships" xmlns:p="http://schemas.openxmlformats.org/presentationml/2006/main">
   <p:cSld>
     <p:spTree>
@@ -7115,7 +7262,7 @@
 </p:sld>
 </file>
 
-<file path=ppt/slides/slide15.xml><?xml version="1.0" encoding="utf-8"?>
+<file path=ppt/slides/slide16.xml><?xml version="1.0" encoding="utf-8"?>
 <p:sld xmlns:a="http://schemas.openxmlformats.org/drawingml/2006/main" xmlns:r="http://schemas.openxmlformats.org/officeDocument/2006/relationships" xmlns:p="http://schemas.openxmlformats.org/presentationml/2006/main">
   <p:cSld>
     <p:spTree>
@@ -7203,7 +7350,7 @@
 </p:sld>
 </file>
 
-<file path=ppt/slides/slide16.xml><?xml version="1.0" encoding="utf-8"?>
+<file path=ppt/slides/slide17.xml><?xml version="1.0" encoding="utf-8"?>
 <p:sld xmlns:a="http://schemas.openxmlformats.org/drawingml/2006/main" xmlns:r="http://schemas.openxmlformats.org/officeDocument/2006/relationships" xmlns:p="http://schemas.openxmlformats.org/presentationml/2006/main">
   <p:cSld>
     <p:spTree>
@@ -7291,120 +7438,6 @@
 </p:sld>
 </file>
 
-<file path=ppt/slides/slide17.xml><?xml version="1.0" encoding="utf-8"?>
-<p:sld xmlns:a="http://schemas.openxmlformats.org/drawingml/2006/main" xmlns:r="http://schemas.openxmlformats.org/officeDocument/2006/relationships" xmlns:p="http://schemas.openxmlformats.org/presentationml/2006/main">
-  <p:cSld>
-    <p:spTree>
-      <p:nvGrpSpPr>
-        <p:cNvPr id="1" name=""/>
-        <p:cNvGrpSpPr/>
-        <p:nvPr/>
-      </p:nvGrpSpPr>
-      <p:grpSpPr>
-        <a:xfrm>
-          <a:off x="0" y="0"/>
-          <a:ext cx="0" cy="0"/>
-          <a:chOff x="0" y="0"/>
-          <a:chExt cx="0" cy="0"/>
-        </a:xfrm>
-      </p:grpSpPr>
-      <p:sp>
-        <p:nvSpPr>
-          <p:cNvPr id="2" name="Title 1"/>
-          <p:cNvSpPr>
-            <a:spLocks noGrp="1"/>
-          </p:cNvSpPr>
-          <p:nvPr>
-            <p:ph type="title"/>
-          </p:nvPr>
-        </p:nvSpPr>
-        <p:spPr/>
-        <p:txBody>
-          <a:bodyPr/>
-          <a:lstStyle/>
-          <a:p>
-            <a:r>
-              <a:rPr lang="bg-BG" dirty="0" smtClean="0"/>
-              <a:t>Гума</a:t>
-            </a:r>
-            <a:endParaRPr lang="bg-BG" dirty="0"/>
-          </a:p>
-        </p:txBody>
-      </p:sp>
-      <p:sp>
-        <p:nvSpPr>
-          <p:cNvPr id="3" name="Content Placeholder 2"/>
-          <p:cNvSpPr>
-            <a:spLocks noGrp="1"/>
-          </p:cNvSpPr>
-          <p:nvPr>
-            <p:ph idx="1"/>
-          </p:nvPr>
-        </p:nvSpPr>
-        <p:spPr/>
-        <p:txBody>
-          <a:bodyPr anchor="t">
-            <a:normAutofit/>
-          </a:bodyPr>
-          <a:lstStyle/>
-          <a:p>
-            <a:r>
-              <a:rPr lang="bg-BG" sz="2000" dirty="0" smtClean="0"/>
-              <a:t>При </a:t>
-            </a:r>
-            <a:r>
-              <a:rPr lang="en-US" sz="2000" dirty="0" smtClean="0"/>
-              <a:t>mouse move </a:t>
-            </a:r>
-            <a:r>
-              <a:rPr lang="bg-BG" sz="2000" dirty="0" smtClean="0"/>
-              <a:t>и </a:t>
-            </a:r>
-            <a:r>
-              <a:rPr lang="en-US" sz="2000" dirty="0" smtClean="0"/>
-              <a:t>mouse down </a:t>
-            </a:r>
-            <a:r>
-              <a:rPr lang="bg-BG" sz="2000" dirty="0" smtClean="0"/>
-              <a:t>на потребител се запазват точките, през които е минал</a:t>
-            </a:r>
-          </a:p>
-          <a:p>
-            <a:r>
-              <a:rPr lang="bg-BG" sz="2000" dirty="0" smtClean="0"/>
-              <a:t>Запазените точки се свързват последователно с линии</a:t>
-            </a:r>
-          </a:p>
-          <a:p>
-            <a:r>
-              <a:rPr lang="bg-BG" sz="2000" dirty="0" smtClean="0"/>
-              <a:t>При </a:t>
-            </a:r>
-            <a:r>
-              <a:rPr lang="en-US" sz="2000" dirty="0" smtClean="0"/>
-              <a:t>mouse up </a:t>
-            </a:r>
-            <a:r>
-              <a:rPr lang="bg-BG" sz="2000" dirty="0" smtClean="0"/>
-              <a:t>цветът на тези точки и точките, генерирани от линиите, става бял, което симулира изтриване</a:t>
-            </a:r>
-            <a:endParaRPr lang="bg-BG" sz="2000" dirty="0"/>
-          </a:p>
-        </p:txBody>
-      </p:sp>
-    </p:spTree>
-    <p:extLst>
-      <p:ext uri="{BB962C8B-B14F-4D97-AF65-F5344CB8AC3E}">
-        <p14:creationId xmlns:p14="http://schemas.microsoft.com/office/powerpoint/2010/main" val="3032680453"/>
-      </p:ext>
-    </p:extLst>
-  </p:cSld>
-  <p:clrMapOvr>
-    <a:masterClrMapping/>
-  </p:clrMapOvr>
-</p:sld>
-</file>
-
 <file path=ppt/slides/slide18.xml><?xml version="1.0" encoding="utf-8"?>
 <p:sld xmlns:a="http://schemas.openxmlformats.org/drawingml/2006/main" xmlns:r="http://schemas.openxmlformats.org/officeDocument/2006/relationships" xmlns:p="http://schemas.openxmlformats.org/presentationml/2006/main">
   <p:cSld>
@@ -7439,14 +7472,135 @@
           <a:p>
             <a:r>
               <a:rPr lang="bg-BG" dirty="0" smtClean="0"/>
+              <a:t>Гума</a:t>
+            </a:r>
+            <a:endParaRPr lang="bg-BG" dirty="0"/>
+          </a:p>
+        </p:txBody>
+      </p:sp>
+      <p:sp>
+        <p:nvSpPr>
+          <p:cNvPr id="3" name="Content Placeholder 2"/>
+          <p:cNvSpPr>
+            <a:spLocks noGrp="1"/>
+          </p:cNvSpPr>
+          <p:nvPr>
+            <p:ph idx="1"/>
+          </p:nvPr>
+        </p:nvSpPr>
+        <p:spPr/>
+        <p:txBody>
+          <a:bodyPr anchor="t">
+            <a:normAutofit/>
+          </a:bodyPr>
+          <a:lstStyle/>
+          <a:p>
+            <a:r>
+              <a:rPr lang="bg-BG" sz="2000" dirty="0" smtClean="0"/>
+              <a:t>При </a:t>
+            </a:r>
+            <a:r>
+              <a:rPr lang="en-US" sz="2000" dirty="0" smtClean="0"/>
+              <a:t>mouse move </a:t>
+            </a:r>
+            <a:r>
+              <a:rPr lang="bg-BG" sz="2000" dirty="0" smtClean="0"/>
+              <a:t>и </a:t>
+            </a:r>
+            <a:r>
+              <a:rPr lang="en-US" sz="2000" dirty="0" smtClean="0"/>
+              <a:t>mouse down </a:t>
+            </a:r>
+            <a:r>
+              <a:rPr lang="bg-BG" sz="2000" dirty="0" smtClean="0"/>
+              <a:t>на потребител се запазват точките, през които е минал</a:t>
+            </a:r>
+          </a:p>
+          <a:p>
+            <a:r>
+              <a:rPr lang="bg-BG" sz="2000" dirty="0" smtClean="0"/>
+              <a:t>Запазените точки се свързват последователно с линии</a:t>
+            </a:r>
+          </a:p>
+          <a:p>
+            <a:r>
+              <a:rPr lang="bg-BG" sz="2000" dirty="0" smtClean="0"/>
+              <a:t>При </a:t>
+            </a:r>
+            <a:r>
+              <a:rPr lang="en-US" sz="2000" dirty="0" smtClean="0"/>
+              <a:t>mouse up </a:t>
+            </a:r>
+            <a:r>
+              <a:rPr lang="bg-BG" sz="2000" dirty="0" smtClean="0"/>
+              <a:t>цветът на тези точки и точките, генерирани от линиите, става бял, което симулира изтриване</a:t>
+            </a:r>
+            <a:endParaRPr lang="bg-BG" sz="2000" dirty="0"/>
+          </a:p>
+        </p:txBody>
+      </p:sp>
+    </p:spTree>
+    <p:extLst>
+      <p:ext uri="{BB962C8B-B14F-4D97-AF65-F5344CB8AC3E}">
+        <p14:creationId xmlns:p14="http://schemas.microsoft.com/office/powerpoint/2010/main" val="3032680453"/>
+      </p:ext>
+    </p:extLst>
+  </p:cSld>
+  <p:clrMapOvr>
+    <a:masterClrMapping/>
+  </p:clrMapOvr>
+  <p:timing>
+    <p:tnLst>
+      <p:par>
+        <p:cTn id="1" dur="indefinite" restart="never" nodeType="tmRoot"/>
+      </p:par>
+    </p:tnLst>
+  </p:timing>
+</p:sld>
+</file>
+
+<file path=ppt/slides/slide19.xml><?xml version="1.0" encoding="utf-8"?>
+<p:sld xmlns:a="http://schemas.openxmlformats.org/drawingml/2006/main" xmlns:r="http://schemas.openxmlformats.org/officeDocument/2006/relationships" xmlns:p="http://schemas.openxmlformats.org/presentationml/2006/main">
+  <p:cSld>
+    <p:spTree>
+      <p:nvGrpSpPr>
+        <p:cNvPr id="1" name=""/>
+        <p:cNvGrpSpPr/>
+        <p:nvPr/>
+      </p:nvGrpSpPr>
+      <p:grpSpPr>
+        <a:xfrm>
+          <a:off x="0" y="0"/>
+          <a:ext cx="0" cy="0"/>
+          <a:chOff x="0" y="0"/>
+          <a:chExt cx="0" cy="0"/>
+        </a:xfrm>
+      </p:grpSpPr>
+      <p:sp>
+        <p:nvSpPr>
+          <p:cNvPr id="2" name="Title 1"/>
+          <p:cNvSpPr>
+            <a:spLocks noGrp="1"/>
+          </p:cNvSpPr>
+          <p:nvPr>
+            <p:ph type="title"/>
+          </p:nvPr>
+        </p:nvSpPr>
+        <p:spPr/>
+        <p:txBody>
+          <a:bodyPr/>
+          <a:lstStyle/>
+          <a:p>
+            <a:r>
+              <a:rPr lang="bg-BG" dirty="0" smtClean="0"/>
               <a:t>Елипса</a:t>
             </a:r>
             <a:endParaRPr lang="bg-BG" dirty="0"/>
           </a:p>
         </p:txBody>
       </p:sp>
-      <mc:AlternateContent xmlns:mc="http://schemas.openxmlformats.org/markup-compatibility/2006">
-        <mc:Choice xmlns:a14="http://schemas.microsoft.com/office/drawing/2010/main" Requires="a14">
+      <mc:AlternateContent xmlns:mc="http://schemas.openxmlformats.org/markup-compatibility/2006" xmlns:a14="http://schemas.microsoft.com/office/drawing/2010/main">
+        <mc:Choice Requires="a14">
           <p:sp>
             <p:nvSpPr>
               <p:cNvPr id="3" name="Content Placeholder 2"/>
@@ -7772,7 +7926,7 @@
             </p:txBody>
           </p:sp>
         </mc:Choice>
-        <mc:Fallback>
+        <mc:Fallback xmlns="">
           <p:sp>
             <p:nvSpPr>
               <p:cNvPr id="3" name="Content Placeholder 2"/>
@@ -7846,10 +8000,153 @@
   <p:clrMapOvr>
     <a:masterClrMapping/>
   </p:clrMapOvr>
+  <p:timing>
+    <p:tnLst>
+      <p:par>
+        <p:cTn id="1" dur="indefinite" restart="never" nodeType="tmRoot"/>
+      </p:par>
+    </p:tnLst>
+  </p:timing>
 </p:sld>
 </file>
 
-<file path=ppt/slides/slide19.xml><?xml version="1.0" encoding="utf-8"?>
+<file path=ppt/slides/slide2.xml><?xml version="1.0" encoding="utf-8"?>
+<p:sld xmlns:a="http://schemas.openxmlformats.org/drawingml/2006/main" xmlns:r="http://schemas.openxmlformats.org/officeDocument/2006/relationships" xmlns:p="http://schemas.openxmlformats.org/presentationml/2006/main">
+  <p:cSld>
+    <p:spTree>
+      <p:nvGrpSpPr>
+        <p:cNvPr id="1" name=""/>
+        <p:cNvGrpSpPr/>
+        <p:nvPr/>
+      </p:nvGrpSpPr>
+      <p:grpSpPr>
+        <a:xfrm>
+          <a:off x="0" y="0"/>
+          <a:ext cx="0" cy="0"/>
+          <a:chOff x="0" y="0"/>
+          <a:chExt cx="0" cy="0"/>
+        </a:xfrm>
+      </p:grpSpPr>
+      <p:sp>
+        <p:nvSpPr>
+          <p:cNvPr id="2" name="Title 1"/>
+          <p:cNvSpPr>
+            <a:spLocks noGrp="1"/>
+          </p:cNvSpPr>
+          <p:nvPr>
+            <p:ph type="title"/>
+          </p:nvPr>
+        </p:nvSpPr>
+        <p:spPr/>
+        <p:txBody>
+          <a:bodyPr/>
+          <a:lstStyle/>
+          <a:p>
+            <a:r>
+              <a:rPr lang="bg-BG" dirty="0" smtClean="0"/>
+              <a:t>Функционалност</a:t>
+            </a:r>
+            <a:endParaRPr lang="bg-BG" dirty="0"/>
+          </a:p>
+        </p:txBody>
+      </p:sp>
+      <p:sp>
+        <p:nvSpPr>
+          <p:cNvPr id="3" name="Content Placeholder 2"/>
+          <p:cNvSpPr>
+            <a:spLocks noGrp="1"/>
+          </p:cNvSpPr>
+          <p:nvPr>
+            <p:ph idx="1"/>
+          </p:nvPr>
+        </p:nvSpPr>
+        <p:spPr>
+          <a:xfrm>
+            <a:off x="677334" y="2160589"/>
+            <a:ext cx="8596668" cy="4165260"/>
+          </a:xfrm>
+        </p:spPr>
+        <p:txBody>
+          <a:bodyPr>
+            <a:normAutofit/>
+          </a:bodyPr>
+          <a:lstStyle/>
+          <a:p>
+            <a:r>
+              <a:rPr lang="bg-BG" sz="2000" dirty="0" smtClean="0"/>
+              <a:t>Молив, гума</a:t>
+            </a:r>
+          </a:p>
+          <a:p>
+            <a:r>
+              <a:rPr lang="bg-BG" sz="2000" dirty="0" smtClean="0"/>
+              <a:t>Рисуване на кръг, линия, правоъгълник, квадрат, триъгълник, елипса</a:t>
+            </a:r>
+          </a:p>
+          <a:p>
+            <a:r>
+              <a:rPr lang="bg-BG" sz="2000" dirty="0" smtClean="0"/>
+              <a:t>Рисуване на криви на Безие и </a:t>
+            </a:r>
+            <a:r>
+              <a:rPr lang="en-US" sz="2000" dirty="0" smtClean="0"/>
+              <a:t>B-</a:t>
+            </a:r>
+            <a:r>
+              <a:rPr lang="bg-BG" sz="2000" dirty="0" smtClean="0"/>
+              <a:t>сплайн криви</a:t>
+            </a:r>
+          </a:p>
+          <a:p>
+            <a:r>
+              <a:rPr lang="bg-BG" sz="2000" dirty="0" smtClean="0"/>
+              <a:t>Слоеве</a:t>
+            </a:r>
+          </a:p>
+          <a:p>
+            <a:r>
+              <a:rPr lang="bg-BG" sz="2000" dirty="0" smtClean="0"/>
+              <a:t>Селектиране на област</a:t>
+            </a:r>
+          </a:p>
+          <a:p>
+            <a:r>
+              <a:rPr lang="bg-BG" sz="2000" dirty="0" smtClean="0"/>
+              <a:t>Завъртане на област</a:t>
+            </a:r>
+          </a:p>
+          <a:p>
+            <a:pPr marL="0" indent="0">
+              <a:buNone/>
+            </a:pPr>
+            <a:endParaRPr lang="bg-BG" dirty="0" smtClean="0"/>
+          </a:p>
+          <a:p>
+            <a:endParaRPr lang="bg-BG" dirty="0"/>
+          </a:p>
+        </p:txBody>
+      </p:sp>
+    </p:spTree>
+    <p:extLst>
+      <p:ext uri="{BB962C8B-B14F-4D97-AF65-F5344CB8AC3E}">
+        <p14:creationId xmlns:p14="http://schemas.microsoft.com/office/powerpoint/2010/main" val="952216432"/>
+      </p:ext>
+    </p:extLst>
+  </p:cSld>
+  <p:clrMapOvr>
+    <a:masterClrMapping/>
+  </p:clrMapOvr>
+  <p:timing>
+    <p:tnLst>
+      <p:par>
+        <p:cTn id="1" dur="indefinite" restart="never" nodeType="tmRoot"/>
+      </p:par>
+    </p:tnLst>
+  </p:timing>
+</p:sld>
+</file>
+
+<file path=ppt/slides/slide20.xml><?xml version="1.0" encoding="utf-8"?>
 <p:sld xmlns:a="http://schemas.openxmlformats.org/drawingml/2006/main" xmlns:r="http://schemas.openxmlformats.org/officeDocument/2006/relationships" xmlns:p="http://schemas.openxmlformats.org/presentationml/2006/main">
   <p:cSld>
     <p:spTree>
@@ -8004,10 +8301,17 @@
   <p:clrMapOvr>
     <a:masterClrMapping/>
   </p:clrMapOvr>
+  <p:timing>
+    <p:tnLst>
+      <p:par>
+        <p:cTn id="1" dur="indefinite" restart="never" nodeType="tmRoot"/>
+      </p:par>
+    </p:tnLst>
+  </p:timing>
 </p:sld>
 </file>
 
-<file path=ppt/slides/slide2.xml><?xml version="1.0" encoding="utf-8"?>
+<file path=ppt/slides/slide21.xml><?xml version="1.0" encoding="utf-8"?>
 <p:sld xmlns:a="http://schemas.openxmlformats.org/drawingml/2006/main" xmlns:r="http://schemas.openxmlformats.org/officeDocument/2006/relationships" xmlns:p="http://schemas.openxmlformats.org/presentationml/2006/main">
   <p:cSld>
     <p:spTree>
@@ -8041,150 +8345,14 @@
           <a:p>
             <a:r>
               <a:rPr lang="bg-BG" dirty="0" smtClean="0"/>
-              <a:t>Функционалност</a:t>
+              <a:t>Завъртане</a:t>
             </a:r>
             <a:endParaRPr lang="bg-BG" dirty="0"/>
           </a:p>
         </p:txBody>
       </p:sp>
-      <p:sp>
-        <p:nvSpPr>
-          <p:cNvPr id="3" name="Content Placeholder 2"/>
-          <p:cNvSpPr>
-            <a:spLocks noGrp="1"/>
-          </p:cNvSpPr>
-          <p:nvPr>
-            <p:ph idx="1"/>
-          </p:nvPr>
-        </p:nvSpPr>
-        <p:spPr>
-          <a:xfrm>
-            <a:off x="677334" y="2160589"/>
-            <a:ext cx="8596668" cy="4165260"/>
-          </a:xfrm>
-        </p:spPr>
-        <p:txBody>
-          <a:bodyPr>
-            <a:normAutofit/>
-          </a:bodyPr>
-          <a:lstStyle/>
-          <a:p>
-            <a:r>
-              <a:rPr lang="bg-BG" sz="2000" dirty="0" smtClean="0"/>
-              <a:t>Молив, гума</a:t>
-            </a:r>
-          </a:p>
-          <a:p>
-            <a:r>
-              <a:rPr lang="bg-BG" sz="2000" dirty="0" smtClean="0"/>
-              <a:t>Рисуване на кръг, линия, правоъгълник, квадрат, триъгълник, елипса</a:t>
-            </a:r>
-          </a:p>
-          <a:p>
-            <a:r>
-              <a:rPr lang="bg-BG" sz="2000" dirty="0" smtClean="0"/>
-              <a:t>Рисуване на криви на Безие и </a:t>
-            </a:r>
-            <a:r>
-              <a:rPr lang="en-US" sz="2000" dirty="0" smtClean="0"/>
-              <a:t>B-</a:t>
-            </a:r>
-            <a:r>
-              <a:rPr lang="bg-BG" sz="2000" dirty="0" smtClean="0"/>
-              <a:t>сплайн криви</a:t>
-            </a:r>
-          </a:p>
-          <a:p>
-            <a:r>
-              <a:rPr lang="bg-BG" sz="2000" dirty="0" smtClean="0"/>
-              <a:t>Слоеве</a:t>
-            </a:r>
-          </a:p>
-          <a:p>
-            <a:r>
-              <a:rPr lang="bg-BG" sz="2000" dirty="0" smtClean="0"/>
-              <a:t>Селектиране на област</a:t>
-            </a:r>
-          </a:p>
-          <a:p>
-            <a:r>
-              <a:rPr lang="bg-BG" sz="2000" dirty="0" smtClean="0"/>
-              <a:t>Завъртане на област</a:t>
-            </a:r>
-          </a:p>
-          <a:p>
-            <a:pPr marL="0" indent="0">
-              <a:buNone/>
-            </a:pPr>
-            <a:endParaRPr lang="bg-BG" dirty="0" smtClean="0"/>
-          </a:p>
-          <a:p>
-            <a:endParaRPr lang="bg-BG" dirty="0"/>
-          </a:p>
-        </p:txBody>
-      </p:sp>
-    </p:spTree>
-    <p:extLst>
-      <p:ext uri="{BB962C8B-B14F-4D97-AF65-F5344CB8AC3E}">
-        <p14:creationId xmlns:p14="http://schemas.microsoft.com/office/powerpoint/2010/main" val="952216432"/>
-      </p:ext>
-    </p:extLst>
-  </p:cSld>
-  <p:clrMapOvr>
-    <a:masterClrMapping/>
-  </p:clrMapOvr>
-  <p:timing>
-    <p:tnLst>
-      <p:par>
-        <p:cTn id="1" dur="indefinite" restart="never" nodeType="tmRoot"/>
-      </p:par>
-    </p:tnLst>
-  </p:timing>
-</p:sld>
-</file>
-
-<file path=ppt/slides/slide20.xml><?xml version="1.0" encoding="utf-8"?>
-<p:sld xmlns:a="http://schemas.openxmlformats.org/drawingml/2006/main" xmlns:r="http://schemas.openxmlformats.org/officeDocument/2006/relationships" xmlns:p="http://schemas.openxmlformats.org/presentationml/2006/main">
-  <p:cSld>
-    <p:spTree>
-      <p:nvGrpSpPr>
-        <p:cNvPr id="1" name=""/>
-        <p:cNvGrpSpPr/>
-        <p:nvPr/>
-      </p:nvGrpSpPr>
-      <p:grpSpPr>
-        <a:xfrm>
-          <a:off x="0" y="0"/>
-          <a:ext cx="0" cy="0"/>
-          <a:chOff x="0" y="0"/>
-          <a:chExt cx="0" cy="0"/>
-        </a:xfrm>
-      </p:grpSpPr>
-      <p:sp>
-        <p:nvSpPr>
-          <p:cNvPr id="2" name="Title 1"/>
-          <p:cNvSpPr>
-            <a:spLocks noGrp="1"/>
-          </p:cNvSpPr>
-          <p:nvPr>
-            <p:ph type="title"/>
-          </p:nvPr>
-        </p:nvSpPr>
-        <p:spPr/>
-        <p:txBody>
-          <a:bodyPr/>
-          <a:lstStyle/>
-          <a:p>
-            <a:r>
-              <a:rPr lang="bg-BG" dirty="0" smtClean="0"/>
-              <a:t>Завъртане</a:t>
-            </a:r>
-            <a:endParaRPr lang="bg-BG" dirty="0"/>
-          </a:p>
-        </p:txBody>
-      </p:sp>
-      <mc:AlternateContent xmlns:mc="http://schemas.openxmlformats.org/markup-compatibility/2006">
-        <mc:Choice xmlns:a14="http://schemas.microsoft.com/office/drawing/2010/main" Requires="a14">
+      <mc:AlternateContent xmlns:mc="http://schemas.openxmlformats.org/markup-compatibility/2006" xmlns:a14="http://schemas.microsoft.com/office/drawing/2010/main">
+        <mc:Choice Requires="a14">
           <p:sp>
             <p:nvSpPr>
               <p:cNvPr id="3" name="Content Placeholder 2"/>
@@ -8292,7 +8460,7 @@
             </p:txBody>
           </p:sp>
         </mc:Choice>
-        <mc:Fallback>
+        <mc:Fallback xmlns="">
           <p:sp>
             <p:nvSpPr>
               <p:cNvPr id="3" name="Content Placeholder 2"/>
@@ -8336,10 +8504,17 @@
   <p:clrMapOvr>
     <a:masterClrMapping/>
   </p:clrMapOvr>
+  <p:timing>
+    <p:tnLst>
+      <p:par>
+        <p:cTn id="1" dur="indefinite" restart="never" nodeType="tmRoot"/>
+      </p:par>
+    </p:tnLst>
+  </p:timing>
 </p:sld>
 </file>
 
-<file path=ppt/slides/slide21.xml><?xml version="1.0" encoding="utf-8"?>
+<file path=ppt/slides/slide22.xml><?xml version="1.0" encoding="utf-8"?>
 <p:sld xmlns:a="http://schemas.openxmlformats.org/drawingml/2006/main" xmlns:r="http://schemas.openxmlformats.org/officeDocument/2006/relationships" xmlns:p="http://schemas.openxmlformats.org/presentationml/2006/main">
   <p:cSld>
     <p:spTree>
@@ -8379,8 +8554,8 @@
           </a:p>
         </p:txBody>
       </p:sp>
-      <mc:AlternateContent xmlns:mc="http://schemas.openxmlformats.org/markup-compatibility/2006">
-        <mc:Choice xmlns:a14="http://schemas.microsoft.com/office/drawing/2010/main" Requires="a14">
+      <mc:AlternateContent xmlns:mc="http://schemas.openxmlformats.org/markup-compatibility/2006" xmlns:a14="http://schemas.microsoft.com/office/drawing/2010/main">
+        <mc:Choice Requires="a14">
           <p:sp>
             <p:nvSpPr>
               <p:cNvPr id="3" name="Content Placeholder 2"/>
@@ -9016,7 +9191,7 @@
             </p:txBody>
           </p:sp>
         </mc:Choice>
-        <mc:Fallback>
+        <mc:Fallback xmlns="">
           <p:sp>
             <p:nvSpPr>
               <p:cNvPr id="3" name="Content Placeholder 2"/>
@@ -9064,10 +9239,17 @@
   <p:clrMapOvr>
     <a:masterClrMapping/>
   </p:clrMapOvr>
+  <p:timing>
+    <p:tnLst>
+      <p:par>
+        <p:cTn id="1" dur="indefinite" restart="never" nodeType="tmRoot"/>
+      </p:par>
+    </p:tnLst>
+  </p:timing>
 </p:sld>
 </file>
 
-<file path=ppt/slides/slide22.xml><?xml version="1.0" encoding="utf-8"?>
+<file path=ppt/slides/slide23.xml><?xml version="1.0" encoding="utf-8"?>
 <p:sld xmlns:a="http://schemas.openxmlformats.org/drawingml/2006/main" xmlns:r="http://schemas.openxmlformats.org/officeDocument/2006/relationships" xmlns:p="http://schemas.openxmlformats.org/presentationml/2006/main">
   <p:cSld>
     <p:spTree>
@@ -9124,6 +9306,13 @@
   <p:clrMapOvr>
     <a:masterClrMapping/>
   </p:clrMapOvr>
+  <p:timing>
+    <p:tnLst>
+      <p:par>
+        <p:cTn id="1" dur="indefinite" restart="never" nodeType="tmRoot"/>
+      </p:par>
+    </p:tnLst>
+  </p:timing>
 </p:sld>
 </file>
 
@@ -9465,6 +9654,88 @@
           <a:p>
             <a:r>
               <a:rPr lang="bg-BG" dirty="0" smtClean="0"/>
+              <a:t>Алгоритъм на Брезенхам</a:t>
+            </a:r>
+            <a:endParaRPr lang="bg-BG" dirty="0"/>
+          </a:p>
+        </p:txBody>
+      </p:sp>
+      <p:pic>
+        <p:nvPicPr>
+          <p:cNvPr id="4" name="Content Placeholder 3"/>
+          <p:cNvPicPr>
+            <a:picLocks noGrp="1" noChangeAspect="1"/>
+          </p:cNvPicPr>
+          <p:nvPr>
+            <p:ph idx="1"/>
+          </p:nvPr>
+        </p:nvPicPr>
+        <p:blipFill>
+          <a:blip r:embed="rId2">
+            <a:extLst>
+              <a:ext uri="{28A0092B-C50C-407E-A947-70E740481C1C}">
+                <a14:useLocalDpi xmlns:a14="http://schemas.microsoft.com/office/drawing/2010/main" val="0"/>
+              </a:ext>
+            </a:extLst>
+          </a:blip>
+          <a:stretch>
+            <a:fillRect/>
+          </a:stretch>
+        </p:blipFill>
+        <p:spPr>
+          <a:xfrm>
+            <a:off x="1446023" y="1270000"/>
+            <a:ext cx="6705939" cy="5101242"/>
+          </a:xfrm>
+        </p:spPr>
+      </p:pic>
+    </p:spTree>
+    <p:extLst>
+      <p:ext uri="{BB962C8B-B14F-4D97-AF65-F5344CB8AC3E}">
+        <p14:creationId xmlns:p14="http://schemas.microsoft.com/office/powerpoint/2010/main" val="4065129785"/>
+      </p:ext>
+    </p:extLst>
+  </p:cSld>
+  <p:clrMapOvr>
+    <a:masterClrMapping/>
+  </p:clrMapOvr>
+</p:sld>
+</file>
+
+<file path=ppt/slides/slide7.xml><?xml version="1.0" encoding="utf-8"?>
+<p:sld xmlns:a="http://schemas.openxmlformats.org/drawingml/2006/main" xmlns:r="http://schemas.openxmlformats.org/officeDocument/2006/relationships" xmlns:p="http://schemas.openxmlformats.org/presentationml/2006/main">
+  <p:cSld>
+    <p:spTree>
+      <p:nvGrpSpPr>
+        <p:cNvPr id="1" name=""/>
+        <p:cNvGrpSpPr/>
+        <p:nvPr/>
+      </p:nvGrpSpPr>
+      <p:grpSpPr>
+        <a:xfrm>
+          <a:off x="0" y="0"/>
+          <a:ext cx="0" cy="0"/>
+          <a:chOff x="0" y="0"/>
+          <a:chExt cx="0" cy="0"/>
+        </a:xfrm>
+      </p:grpSpPr>
+      <p:sp>
+        <p:nvSpPr>
+          <p:cNvPr id="2" name="Title 1"/>
+          <p:cNvSpPr>
+            <a:spLocks noGrp="1"/>
+          </p:cNvSpPr>
+          <p:nvPr>
+            <p:ph type="title"/>
+          </p:nvPr>
+        </p:nvSpPr>
+        <p:spPr/>
+        <p:txBody>
+          <a:bodyPr/>
+          <a:lstStyle/>
+          <a:p>
+            <a:r>
+              <a:rPr lang="bg-BG" dirty="0" smtClean="0"/>
               <a:t>Криви на Безие</a:t>
             </a:r>
             <a:endParaRPr lang="bg-BG" dirty="0"/>
@@ -9570,7 +9841,7 @@
           <a:graphicData uri="http://schemas.openxmlformats.org/presentationml/2006/ole">
             <mc:AlternateContent xmlns:mc="http://schemas.openxmlformats.org/markup-compatibility/2006">
               <mc:Choice xmlns:v="urn:schemas-microsoft-com:vml" Requires="v">
-                <p:oleObj spid="_x0000_s1031" name="Equation" r:id="rId3" imgW="114120" imgH="177480" progId="Equation.DSMT4">
+                <p:oleObj spid="_x0000_s1032" name="Equation" r:id="rId3" imgW="114120" imgH="177480" progId="Equation.DSMT4">
                   <p:embed/>
                 </p:oleObj>
               </mc:Choice>
@@ -9685,7 +9956,7 @@
 </p:sld>
 </file>
 
-<file path=ppt/slides/slide7.xml><?xml version="1.0" encoding="utf-8"?>
+<file path=ppt/slides/slide8.xml><?xml version="1.0" encoding="utf-8"?>
 <p:sld xmlns:a="http://schemas.openxmlformats.org/drawingml/2006/main" xmlns:r="http://schemas.openxmlformats.org/officeDocument/2006/relationships" xmlns:p="http://schemas.openxmlformats.org/presentationml/2006/main">
   <p:cSld>
     <p:spTree>
@@ -9890,7 +10161,7 @@
 </p:sld>
 </file>
 
-<file path=ppt/slides/slide8.xml><?xml version="1.0" encoding="utf-8"?>
+<file path=ppt/slides/slide9.xml><?xml version="1.0" encoding="utf-8"?>
 <p:sld xmlns:a="http://schemas.openxmlformats.org/drawingml/2006/main" xmlns:r="http://schemas.openxmlformats.org/officeDocument/2006/relationships" xmlns:p="http://schemas.openxmlformats.org/presentationml/2006/main">
   <p:cSld>
     <p:spTree>
@@ -10041,7 +10312,7 @@
           <a:graphicData uri="http://schemas.openxmlformats.org/presentationml/2006/ole">
             <mc:AlternateContent xmlns:mc="http://schemas.openxmlformats.org/markup-compatibility/2006">
               <mc:Choice xmlns:v="urn:schemas-microsoft-com:vml" Requires="v">
-                <p:oleObj spid="_x0000_s2065" name="Equation" r:id="rId4" imgW="1930320" imgH="482400" progId="Equation.DSMT4">
+                <p:oleObj spid="_x0000_s2068" name="Equation" r:id="rId4" imgW="1930320" imgH="482400" progId="Equation.DSMT4">
                   <p:embed/>
                 </p:oleObj>
               </mc:Choice>
@@ -10094,7 +10365,7 @@
           <a:graphicData uri="http://schemas.openxmlformats.org/presentationml/2006/ole">
             <mc:AlternateContent xmlns:mc="http://schemas.openxmlformats.org/markup-compatibility/2006">
               <mc:Choice xmlns:v="urn:schemas-microsoft-com:vml" Requires="v">
-                <p:oleObj spid="_x0000_s2066" name="Equation" r:id="rId6" imgW="152280" imgH="164880" progId="Equation.DSMT4">
+                <p:oleObj spid="_x0000_s2069" name="Equation" r:id="rId6" imgW="152280" imgH="164880" progId="Equation.DSMT4">
                   <p:embed/>
                 </p:oleObj>
               </mc:Choice>
@@ -10147,7 +10418,7 @@
           <a:graphicData uri="http://schemas.openxmlformats.org/presentationml/2006/ole">
             <mc:AlternateContent xmlns:mc="http://schemas.openxmlformats.org/markup-compatibility/2006">
               <mc:Choice xmlns:v="urn:schemas-microsoft-com:vml" Requires="v">
-                <p:oleObj spid="_x0000_s2067" name="Equation" r:id="rId8" imgW="152280" imgH="164880" progId="Equation.DSMT4">
+                <p:oleObj spid="_x0000_s2070" name="Equation" r:id="rId8" imgW="152280" imgH="164880" progId="Equation.DSMT4">
                   <p:embed/>
                 </p:oleObj>
               </mc:Choice>
@@ -10186,152 +10457,6 @@
     <p:extLst>
       <p:ext uri="{BB962C8B-B14F-4D97-AF65-F5344CB8AC3E}">
         <p14:creationId xmlns:p14="http://schemas.microsoft.com/office/powerpoint/2010/main" val="2690007377"/>
-      </p:ext>
-    </p:extLst>
-  </p:cSld>
-  <p:clrMapOvr>
-    <a:masterClrMapping/>
-  </p:clrMapOvr>
-  <p:timing>
-    <p:tnLst>
-      <p:par>
-        <p:cTn id="1" dur="indefinite" restart="never" nodeType="tmRoot"/>
-      </p:par>
-    </p:tnLst>
-  </p:timing>
-</p:sld>
-</file>
-
-<file path=ppt/slides/slide9.xml><?xml version="1.0" encoding="utf-8"?>
-<p:sld xmlns:a="http://schemas.openxmlformats.org/drawingml/2006/main" xmlns:r="http://schemas.openxmlformats.org/officeDocument/2006/relationships" xmlns:p="http://schemas.openxmlformats.org/presentationml/2006/main">
-  <p:cSld>
-    <p:spTree>
-      <p:nvGrpSpPr>
-        <p:cNvPr id="1" name=""/>
-        <p:cNvGrpSpPr/>
-        <p:nvPr/>
-      </p:nvGrpSpPr>
-      <p:grpSpPr>
-        <a:xfrm>
-          <a:off x="0" y="0"/>
-          <a:ext cx="0" cy="0"/>
-          <a:chOff x="0" y="0"/>
-          <a:chExt cx="0" cy="0"/>
-        </a:xfrm>
-      </p:grpSpPr>
-      <p:sp>
-        <p:nvSpPr>
-          <p:cNvPr id="2" name="Title 1"/>
-          <p:cNvSpPr>
-            <a:spLocks noGrp="1"/>
-          </p:cNvSpPr>
-          <p:nvPr>
-            <p:ph type="title"/>
-          </p:nvPr>
-        </p:nvSpPr>
-        <p:spPr/>
-        <p:txBody>
-          <a:bodyPr/>
-          <a:lstStyle/>
-          <a:p>
-            <a:r>
-              <a:rPr lang="bg-BG" dirty="0" smtClean="0"/>
-              <a:t>Правоъгълник</a:t>
-            </a:r>
-            <a:endParaRPr lang="bg-BG" dirty="0"/>
-          </a:p>
-        </p:txBody>
-      </p:sp>
-      <p:sp>
-        <p:nvSpPr>
-          <p:cNvPr id="7" name="TextBox 6"/>
-          <p:cNvSpPr txBox="1"/>
-          <p:nvPr/>
-        </p:nvSpPr>
-        <p:spPr>
-          <a:xfrm>
-            <a:off x="1009948" y="1842766"/>
-            <a:ext cx="2403222" cy="984885"/>
-          </a:xfrm>
-          <a:prstGeom prst="rect">
-            <a:avLst/>
-          </a:prstGeom>
-          <a:noFill/>
-        </p:spPr>
-        <p:txBody>
-          <a:bodyPr wrap="none" rtlCol="0">
-            <a:spAutoFit/>
-          </a:bodyPr>
-          <a:lstStyle/>
-          <a:p>
-            <a:r>
-              <a:rPr lang="en-US" sz="2000" dirty="0"/>
-              <a:t>P1 – </a:t>
-            </a:r>
-            <a:r>
-              <a:rPr lang="bg-BG" sz="2000" dirty="0"/>
-              <a:t>начална точка</a:t>
-            </a:r>
-          </a:p>
-          <a:p>
-            <a:r>
-              <a:rPr lang="en-US" sz="2000" dirty="0"/>
-              <a:t>P2 </a:t>
-            </a:r>
-            <a:r>
-              <a:rPr lang="en-US" sz="2000" dirty="0" smtClean="0"/>
-              <a:t>–</a:t>
-            </a:r>
-            <a:r>
-              <a:rPr lang="bg-BG" sz="2000" dirty="0" smtClean="0"/>
-              <a:t> крайна </a:t>
-            </a:r>
-            <a:r>
-              <a:rPr lang="bg-BG" sz="2000" dirty="0"/>
-              <a:t>точка</a:t>
-            </a:r>
-          </a:p>
-          <a:p>
-            <a:endParaRPr lang="en-US" dirty="0">
-              <a:latin typeface="Times New Roman" panose="02020603050405020304" pitchFamily="18" charset="0"/>
-              <a:cs typeface="Times New Roman" panose="02020603050405020304" pitchFamily="18" charset="0"/>
-            </a:endParaRPr>
-          </a:p>
-        </p:txBody>
-      </p:sp>
-      <p:pic>
-        <p:nvPicPr>
-          <p:cNvPr id="4" name="Content Placeholder 3"/>
-          <p:cNvPicPr>
-            <a:picLocks noGrp="1" noChangeAspect="1"/>
-          </p:cNvPicPr>
-          <p:nvPr>
-            <p:ph idx="1"/>
-          </p:nvPr>
-        </p:nvPicPr>
-        <p:blipFill>
-          <a:blip r:embed="rId2">
-            <a:extLst>
-              <a:ext uri="{28A0092B-C50C-407E-A947-70E740481C1C}">
-                <a14:useLocalDpi xmlns:a14="http://schemas.microsoft.com/office/drawing/2010/main" val="0"/>
-              </a:ext>
-            </a:extLst>
-          </a:blip>
-          <a:stretch>
-            <a:fillRect/>
-          </a:stretch>
-        </p:blipFill>
-        <p:spPr>
-          <a:xfrm>
-            <a:off x="4435907" y="1930400"/>
-            <a:ext cx="4838095" cy="2790476"/>
-          </a:xfrm>
-        </p:spPr>
-      </p:pic>
-    </p:spTree>
-    <p:extLst>
-      <p:ext uri="{BB962C8B-B14F-4D97-AF65-F5344CB8AC3E}">
-        <p14:creationId xmlns:p14="http://schemas.microsoft.com/office/powerpoint/2010/main" val="3405315550"/>
       </p:ext>
     </p:extLst>
   </p:cSld>

</xml_diff>